<commit_message>
first ms push with hydraulic geometry stuff
</commit_message>
<xml_diff>
--- a/Zappa_notes_2.pptx
+++ b/Zappa_notes_2.pptx
@@ -7,7 +7,9 @@
   <p:sldIdLst>
     <p:sldId id="260" r:id="rId2"/>
     <p:sldId id="263" r:id="rId3"/>
-    <p:sldId id="261" r:id="rId4"/>
+    <p:sldId id="266" r:id="rId4"/>
+    <p:sldId id="261" r:id="rId5"/>
+    <p:sldId id="264" r:id="rId6"/>
   </p:sldIdLst>
   <p:sldSz cx="12192000" cy="6858000"/>
   <p:notesSz cx="6858000" cy="9144000"/>
@@ -106,13 +108,18 @@
       </a:defRPr>
     </a:lvl9pPr>
   </p:defaultTextStyle>
+  <p:extLst>
+    <p:ext uri="{EFAFB233-063F-42B5-8137-9DF3F51BA10A}">
+      <p15:sldGuideLst xmlns:p15="http://schemas.microsoft.com/office/powerpoint/2012/main"/>
+    </p:ext>
+  </p:extLst>
 </p:presentation>
 </file>
 
 <file path=ppt/revisionInfo.xml><?xml version="1.0" encoding="utf-8"?>
 <p1510:revInfo xmlns:a="http://schemas.openxmlformats.org/drawingml/2006/main" xmlns:r="http://schemas.openxmlformats.org/officeDocument/2006/relationships" xmlns:p1510="http://schemas.microsoft.com/office/powerpoint/2015/10/main">
   <p1510:revLst>
-    <p1510:client id="{19715C1B-6A5C-4480-830B-1128DB660155}" v="2727" dt="2021-09-09T20:38:23.474"/>
+    <p1510:client id="{19715C1B-6A5C-4480-830B-1128DB660155}" v="3652" dt="2021-09-10T22:22:18.101"/>
   </p1510:revLst>
 </p1510:revInfo>
 </file>
@@ -121,8 +128,8 @@
 <pc:chgInfo xmlns:a="http://schemas.openxmlformats.org/drawingml/2006/main" xmlns:r="http://schemas.openxmlformats.org/officeDocument/2006/relationships" xmlns:ac="http://schemas.microsoft.com/office/drawing/2013/main/command" xmlns:pc="http://schemas.microsoft.com/office/powerpoint/2013/main/command">
   <pc:docChgLst>
     <pc:chgData name="Craig Brinkerhoff" userId="4ca67c74-3213-4250-9c32-077ebf257a4d" providerId="ADAL" clId="{19715C1B-6A5C-4480-830B-1128DB660155}"/>
-    <pc:docChg chg="undo custSel addSld delSld modSld">
-      <pc:chgData name="Craig Brinkerhoff" userId="4ca67c74-3213-4250-9c32-077ebf257a4d" providerId="ADAL" clId="{19715C1B-6A5C-4480-830B-1128DB660155}" dt="2021-09-09T20:38:55.605" v="6594" actId="207"/>
+    <pc:docChg chg="undo custSel addSld delSld modSld sldOrd">
+      <pc:chgData name="Craig Brinkerhoff" userId="4ca67c74-3213-4250-9c32-077ebf257a4d" providerId="ADAL" clId="{19715C1B-6A5C-4480-830B-1128DB660155}" dt="2021-09-10T22:22:52.143" v="9203" actId="693"/>
       <pc:docMkLst>
         <pc:docMk/>
       </pc:docMkLst>
@@ -434,8 +441,8 @@
           </ac:cxnSpMkLst>
         </pc:cxnChg>
       </pc:sldChg>
-      <pc:sldChg chg="modSp new mod">
-        <pc:chgData name="Craig Brinkerhoff" userId="4ca67c74-3213-4250-9c32-077ebf257a4d" providerId="ADAL" clId="{19715C1B-6A5C-4480-830B-1128DB660155}" dt="2021-09-09T20:36:36.610" v="6514" actId="20577"/>
+      <pc:sldChg chg="modSp new mod ord">
+        <pc:chgData name="Craig Brinkerhoff" userId="4ca67c74-3213-4250-9c32-077ebf257a4d" providerId="ADAL" clId="{19715C1B-6A5C-4480-830B-1128DB660155}" dt="2021-09-10T22:08:59.414" v="9175" actId="33524"/>
         <pc:sldMkLst>
           <pc:docMk/>
           <pc:sldMk cId="1764610376" sldId="260"/>
@@ -449,7 +456,7 @@
           </ac:spMkLst>
         </pc:spChg>
         <pc:spChg chg="mod">
-          <ac:chgData name="Craig Brinkerhoff" userId="4ca67c74-3213-4250-9c32-077ebf257a4d" providerId="ADAL" clId="{19715C1B-6A5C-4480-830B-1128DB660155}" dt="2021-09-09T20:36:36.610" v="6514" actId="20577"/>
+          <ac:chgData name="Craig Brinkerhoff" userId="4ca67c74-3213-4250-9c32-077ebf257a4d" providerId="ADAL" clId="{19715C1B-6A5C-4480-830B-1128DB660155}" dt="2021-09-10T22:08:59.414" v="9175" actId="33524"/>
           <ac:spMkLst>
             <pc:docMk/>
             <pc:sldMk cId="1764610376" sldId="260"/>
@@ -458,13 +465,13 @@
         </pc:spChg>
       </pc:sldChg>
       <pc:sldChg chg="addSp delSp modSp new mod setBg">
-        <pc:chgData name="Craig Brinkerhoff" userId="4ca67c74-3213-4250-9c32-077ebf257a4d" providerId="ADAL" clId="{19715C1B-6A5C-4480-830B-1128DB660155}" dt="2021-09-09T20:38:55.605" v="6594" actId="207"/>
+        <pc:chgData name="Craig Brinkerhoff" userId="4ca67c74-3213-4250-9c32-077ebf257a4d" providerId="ADAL" clId="{19715C1B-6A5C-4480-830B-1128DB660155}" dt="2021-09-10T22:22:52.143" v="9203" actId="693"/>
         <pc:sldMkLst>
           <pc:docMk/>
           <pc:sldMk cId="3779462781" sldId="261"/>
         </pc:sldMkLst>
-        <pc:spChg chg="add mod">
-          <ac:chgData name="Craig Brinkerhoff" userId="4ca67c74-3213-4250-9c32-077ebf257a4d" providerId="ADAL" clId="{19715C1B-6A5C-4480-830B-1128DB660155}" dt="2021-09-09T20:31:34.732" v="5976" actId="1076"/>
+        <pc:spChg chg="add del mod">
+          <ac:chgData name="Craig Brinkerhoff" userId="4ca67c74-3213-4250-9c32-077ebf257a4d" providerId="ADAL" clId="{19715C1B-6A5C-4480-830B-1128DB660155}" dt="2021-09-10T21:43:12.211" v="8624" actId="21"/>
           <ac:spMkLst>
             <pc:docMk/>
             <pc:sldMk cId="3779462781" sldId="261"/>
@@ -496,7 +503,7 @@
           </ac:spMkLst>
         </pc:spChg>
         <pc:spChg chg="add mod">
-          <ac:chgData name="Craig Brinkerhoff" userId="4ca67c74-3213-4250-9c32-077ebf257a4d" providerId="ADAL" clId="{19715C1B-6A5C-4480-830B-1128DB660155}" dt="2021-09-09T20:38:55.605" v="6594" actId="207"/>
+          <ac:chgData name="Craig Brinkerhoff" userId="4ca67c74-3213-4250-9c32-077ebf257a4d" providerId="ADAL" clId="{19715C1B-6A5C-4480-830B-1128DB660155}" dt="2021-09-10T21:48:18.523" v="8703" actId="1076"/>
           <ac:spMkLst>
             <pc:docMk/>
             <pc:sldMk cId="3779462781" sldId="261"/>
@@ -535,6 +542,14 @@
             <ac:picMk id="3" creationId="{B664C31A-6E38-4496-ACC5-50DAB18C6FF3}"/>
           </ac:picMkLst>
         </pc:picChg>
+        <pc:picChg chg="add mod">
+          <ac:chgData name="Craig Brinkerhoff" userId="4ca67c74-3213-4250-9c32-077ebf257a4d" providerId="ADAL" clId="{19715C1B-6A5C-4480-830B-1128DB660155}" dt="2021-09-10T22:22:21.294" v="9199" actId="27614"/>
+          <ac:picMkLst>
+            <pc:docMk/>
+            <pc:sldMk cId="3779462781" sldId="261"/>
+            <ac:picMk id="3" creationId="{CD37A3AE-71DF-46B7-A4D4-3CBE5D6590D3}"/>
+          </ac:picMkLst>
+        </pc:picChg>
         <pc:picChg chg="add del mod">
           <ac:chgData name="Craig Brinkerhoff" userId="4ca67c74-3213-4250-9c32-077ebf257a4d" providerId="ADAL" clId="{19715C1B-6A5C-4480-830B-1128DB660155}" dt="2021-09-09T20:30:44.500" v="5964" actId="478"/>
           <ac:picMkLst>
@@ -551,8 +566,8 @@
             <ac:picMk id="12" creationId="{B1936129-31C6-4B05-A57A-8FB994F08C64}"/>
           </ac:picMkLst>
         </pc:picChg>
-        <pc:picChg chg="add mod">
-          <ac:chgData name="Craig Brinkerhoff" userId="4ca67c74-3213-4250-9c32-077ebf257a4d" providerId="ADAL" clId="{19715C1B-6A5C-4480-830B-1128DB660155}" dt="2021-09-09T20:31:24.725" v="5972" actId="1076"/>
+        <pc:picChg chg="add del mod">
+          <ac:chgData name="Craig Brinkerhoff" userId="4ca67c74-3213-4250-9c32-077ebf257a4d" providerId="ADAL" clId="{19715C1B-6A5C-4480-830B-1128DB660155}" dt="2021-09-10T22:22:15.728" v="9196" actId="478"/>
           <ac:picMkLst>
             <pc:docMk/>
             <pc:sldMk cId="3779462781" sldId="261"/>
@@ -583,6 +598,14 @@
             <ac:picMk id="1026" creationId="{FA856178-35F3-4FB9-8096-15460F985F10}"/>
           </ac:picMkLst>
         </pc:picChg>
+        <pc:cxnChg chg="add mod">
+          <ac:chgData name="Craig Brinkerhoff" userId="4ca67c74-3213-4250-9c32-077ebf257a4d" providerId="ADAL" clId="{19715C1B-6A5C-4480-830B-1128DB660155}" dt="2021-09-10T22:22:52.143" v="9203" actId="693"/>
+          <ac:cxnSpMkLst>
+            <pc:docMk/>
+            <pc:sldMk cId="3779462781" sldId="261"/>
+            <ac:cxnSpMk id="6" creationId="{55EF8931-F184-4914-8C0C-50F558DC1642}"/>
+          </ac:cxnSpMkLst>
+        </pc:cxnChg>
         <pc:cxnChg chg="add del mod">
           <ac:chgData name="Craig Brinkerhoff" userId="4ca67c74-3213-4250-9c32-077ebf257a4d" providerId="ADAL" clId="{19715C1B-6A5C-4480-830B-1128DB660155}" dt="2021-09-09T20:30:45.726" v="5966" actId="478"/>
           <ac:cxnSpMkLst>
@@ -608,13 +631,13 @@
         </pc:spChg>
       </pc:sldChg>
       <pc:sldChg chg="addSp delSp modSp new mod">
-        <pc:chgData name="Craig Brinkerhoff" userId="4ca67c74-3213-4250-9c32-077ebf257a4d" providerId="ADAL" clId="{19715C1B-6A5C-4480-830B-1128DB660155}" dt="2021-09-09T20:38:23.474" v="6591" actId="20577"/>
+        <pc:chgData name="Craig Brinkerhoff" userId="4ca67c74-3213-4250-9c32-077ebf257a4d" providerId="ADAL" clId="{19715C1B-6A5C-4480-830B-1128DB660155}" dt="2021-09-10T21:39:26.057" v="8595" actId="20577"/>
         <pc:sldMkLst>
           <pc:docMk/>
           <pc:sldMk cId="3578953865" sldId="263"/>
         </pc:sldMkLst>
-        <pc:spChg chg="add mod">
-          <ac:chgData name="Craig Brinkerhoff" userId="4ca67c74-3213-4250-9c32-077ebf257a4d" providerId="ADAL" clId="{19715C1B-6A5C-4480-830B-1128DB660155}" dt="2021-09-09T17:47:02.041" v="4030" actId="14100"/>
+        <pc:spChg chg="add del mod">
+          <ac:chgData name="Craig Brinkerhoff" userId="4ca67c74-3213-4250-9c32-077ebf257a4d" providerId="ADAL" clId="{19715C1B-6A5C-4480-830B-1128DB660155}" dt="2021-09-10T21:37:53.034" v="8461" actId="478"/>
           <ac:spMkLst>
             <pc:docMk/>
             <pc:sldMk cId="3578953865" sldId="263"/>
@@ -630,7 +653,7 @@
           </ac:spMkLst>
         </pc:spChg>
         <pc:spChg chg="add mod">
-          <ac:chgData name="Craig Brinkerhoff" userId="4ca67c74-3213-4250-9c32-077ebf257a4d" providerId="ADAL" clId="{19715C1B-6A5C-4480-830B-1128DB660155}" dt="2021-09-09T20:34:43.795" v="6351" actId="20577"/>
+          <ac:chgData name="Craig Brinkerhoff" userId="4ca67c74-3213-4250-9c32-077ebf257a4d" providerId="ADAL" clId="{19715C1B-6A5C-4480-830B-1128DB660155}" dt="2021-09-10T21:39:26.057" v="8595" actId="20577"/>
           <ac:spMkLst>
             <pc:docMk/>
             <pc:sldMk cId="3578953865" sldId="263"/>
@@ -645,24 +668,24 @@
             <ac:spMk id="7" creationId="{4121CA9C-9F38-4B76-AA52-3062860358B5}"/>
           </ac:spMkLst>
         </pc:spChg>
-        <pc:spChg chg="add mod">
-          <ac:chgData name="Craig Brinkerhoff" userId="4ca67c74-3213-4250-9c32-077ebf257a4d" providerId="ADAL" clId="{19715C1B-6A5C-4480-830B-1128DB660155}" dt="2021-09-09T20:37:52.364" v="6543" actId="20577"/>
+        <pc:spChg chg="add del mod">
+          <ac:chgData name="Craig Brinkerhoff" userId="4ca67c74-3213-4250-9c32-077ebf257a4d" providerId="ADAL" clId="{19715C1B-6A5C-4480-830B-1128DB660155}" dt="2021-09-10T21:37:13.534" v="8448" actId="21"/>
           <ac:spMkLst>
             <pc:docMk/>
             <pc:sldMk cId="3578953865" sldId="263"/>
             <ac:spMk id="9" creationId="{153A8796-5559-42AC-90D0-77E5A4B1CB5A}"/>
           </ac:spMkLst>
         </pc:spChg>
-        <pc:spChg chg="add mod">
-          <ac:chgData name="Craig Brinkerhoff" userId="4ca67c74-3213-4250-9c32-077ebf257a4d" providerId="ADAL" clId="{19715C1B-6A5C-4480-830B-1128DB660155}" dt="2021-09-09T20:38:23.474" v="6591" actId="20577"/>
+        <pc:spChg chg="add del mod">
+          <ac:chgData name="Craig Brinkerhoff" userId="4ca67c74-3213-4250-9c32-077ebf257a4d" providerId="ADAL" clId="{19715C1B-6A5C-4480-830B-1128DB660155}" dt="2021-09-10T21:37:13.534" v="8448" actId="21"/>
           <ac:spMkLst>
             <pc:docMk/>
             <pc:sldMk cId="3578953865" sldId="263"/>
             <ac:spMk id="11" creationId="{37731284-2C69-47F0-859C-CE4AD7B17468}"/>
           </ac:spMkLst>
         </pc:spChg>
-        <pc:spChg chg="add mod">
-          <ac:chgData name="Craig Brinkerhoff" userId="4ca67c74-3213-4250-9c32-077ebf257a4d" providerId="ADAL" clId="{19715C1B-6A5C-4480-830B-1128DB660155}" dt="2021-09-09T18:31:00.214" v="5515" actId="115"/>
+        <pc:spChg chg="add del mod">
+          <ac:chgData name="Craig Brinkerhoff" userId="4ca67c74-3213-4250-9c32-077ebf257a4d" providerId="ADAL" clId="{19715C1B-6A5C-4480-830B-1128DB660155}" dt="2021-09-10T21:38:09.396" v="8468" actId="478"/>
           <ac:spMkLst>
             <pc:docMk/>
             <pc:sldMk cId="3578953865" sldId="263"/>
@@ -670,7 +693,15 @@
           </ac:spMkLst>
         </pc:spChg>
         <pc:picChg chg="add mod">
-          <ac:chgData name="Craig Brinkerhoff" userId="4ca67c74-3213-4250-9c32-077ebf257a4d" providerId="ADAL" clId="{19715C1B-6A5C-4480-830B-1128DB660155}" dt="2021-09-09T18:30:45.504" v="5511" actId="1076"/>
+          <ac:chgData name="Craig Brinkerhoff" userId="4ca67c74-3213-4250-9c32-077ebf257a4d" providerId="ADAL" clId="{19715C1B-6A5C-4480-830B-1128DB660155}" dt="2021-09-10T21:38:10.987" v="8469" actId="1076"/>
+          <ac:picMkLst>
+            <pc:docMk/>
+            <pc:sldMk cId="3578953865" sldId="263"/>
+            <ac:picMk id="4" creationId="{EBF82825-B6F8-4711-831E-5FF12A7329B8}"/>
+          </ac:picMkLst>
+        </pc:picChg>
+        <pc:picChg chg="add del mod">
+          <ac:chgData name="Craig Brinkerhoff" userId="4ca67c74-3213-4250-9c32-077ebf257a4d" providerId="ADAL" clId="{19715C1B-6A5C-4480-830B-1128DB660155}" dt="2021-09-10T21:37:49.522" v="8459" actId="478"/>
           <ac:picMkLst>
             <pc:docMk/>
             <pc:sldMk cId="3578953865" sldId="263"/>
@@ -781,12 +812,137 @@
           </ac:cxnSpMkLst>
         </pc:cxnChg>
       </pc:sldChg>
+      <pc:sldChg chg="modSp new mod">
+        <pc:chgData name="Craig Brinkerhoff" userId="4ca67c74-3213-4250-9c32-077ebf257a4d" providerId="ADAL" clId="{19715C1B-6A5C-4480-830B-1128DB660155}" dt="2021-09-10T21:49:15.968" v="8737" actId="20577"/>
+        <pc:sldMkLst>
+          <pc:docMk/>
+          <pc:sldMk cId="946737534" sldId="264"/>
+        </pc:sldMkLst>
+        <pc:spChg chg="mod">
+          <ac:chgData name="Craig Brinkerhoff" userId="4ca67c74-3213-4250-9c32-077ebf257a4d" providerId="ADAL" clId="{19715C1B-6A5C-4480-830B-1128DB660155}" dt="2021-09-09T21:32:51.580" v="6688" actId="20577"/>
+          <ac:spMkLst>
+            <pc:docMk/>
+            <pc:sldMk cId="946737534" sldId="264"/>
+            <ac:spMk id="2" creationId="{BAEF32F9-9F19-4C90-956B-CE6FF0FD8366}"/>
+          </ac:spMkLst>
+        </pc:spChg>
+        <pc:spChg chg="mod">
+          <ac:chgData name="Craig Brinkerhoff" userId="4ca67c74-3213-4250-9c32-077ebf257a4d" providerId="ADAL" clId="{19715C1B-6A5C-4480-830B-1128DB660155}" dt="2021-09-10T21:49:15.968" v="8737" actId="20577"/>
+          <ac:spMkLst>
+            <pc:docMk/>
+            <pc:sldMk cId="946737534" sldId="264"/>
+            <ac:spMk id="3" creationId="{31C5C002-A510-4E15-B2FA-5FC09EA9A031}"/>
+          </ac:spMkLst>
+        </pc:spChg>
+      </pc:sldChg>
+      <pc:sldChg chg="modSp new del mod ord">
+        <pc:chgData name="Craig Brinkerhoff" userId="4ca67c74-3213-4250-9c32-077ebf257a4d" providerId="ADAL" clId="{19715C1B-6A5C-4480-830B-1128DB660155}" dt="2021-09-10T22:04:18.723" v="8846" actId="2696"/>
+        <pc:sldMkLst>
+          <pc:docMk/>
+          <pc:sldMk cId="1220116718" sldId="265"/>
+        </pc:sldMkLst>
+        <pc:spChg chg="mod">
+          <ac:chgData name="Craig Brinkerhoff" userId="4ca67c74-3213-4250-9c32-077ebf257a4d" providerId="ADAL" clId="{19715C1B-6A5C-4480-830B-1128DB660155}" dt="2021-09-10T19:58:36.936" v="7183" actId="20577"/>
+          <ac:spMkLst>
+            <pc:docMk/>
+            <pc:sldMk cId="1220116718" sldId="265"/>
+            <ac:spMk id="2" creationId="{D4FFEF4E-C86F-4EF5-AAD0-4D225A47FE30}"/>
+          </ac:spMkLst>
+        </pc:spChg>
+        <pc:spChg chg="mod">
+          <ac:chgData name="Craig Brinkerhoff" userId="4ca67c74-3213-4250-9c32-077ebf257a4d" providerId="ADAL" clId="{19715C1B-6A5C-4480-830B-1128DB660155}" dt="2021-09-10T21:49:52.170" v="8749" actId="14100"/>
+          <ac:spMkLst>
+            <pc:docMk/>
+            <pc:sldMk cId="1220116718" sldId="265"/>
+            <ac:spMk id="3" creationId="{F1D1428F-E718-4D89-8FEA-6C8DDE170DEE}"/>
+          </ac:spMkLst>
+        </pc:spChg>
+      </pc:sldChg>
       <pc:sldChg chg="add del">
         <pc:chgData name="Craig Brinkerhoff" userId="4ca67c74-3213-4250-9c32-077ebf257a4d" providerId="ADAL" clId="{19715C1B-6A5C-4480-830B-1128DB660155}" dt="2021-09-09T19:50:41.713" v="5962" actId="2696"/>
         <pc:sldMkLst>
           <pc:docMk/>
           <pc:sldMk cId="1591065156" sldId="265"/>
         </pc:sldMkLst>
+      </pc:sldChg>
+      <pc:sldChg chg="addSp delSp modSp new mod">
+        <pc:chgData name="Craig Brinkerhoff" userId="4ca67c74-3213-4250-9c32-077ebf257a4d" providerId="ADAL" clId="{19715C1B-6A5C-4480-830B-1128DB660155}" dt="2021-09-10T22:14:59.156" v="9195" actId="20577"/>
+        <pc:sldMkLst>
+          <pc:docMk/>
+          <pc:sldMk cId="3557711385" sldId="266"/>
+        </pc:sldMkLst>
+        <pc:spChg chg="del">
+          <ac:chgData name="Craig Brinkerhoff" userId="4ca67c74-3213-4250-9c32-077ebf257a4d" providerId="ADAL" clId="{19715C1B-6A5C-4480-830B-1128DB660155}" dt="2021-09-10T21:37:21.950" v="8452" actId="478"/>
+          <ac:spMkLst>
+            <pc:docMk/>
+            <pc:sldMk cId="3557711385" sldId="266"/>
+            <ac:spMk id="2" creationId="{9E4D803B-2C4E-4E6B-A2A4-3A0498453296}"/>
+          </ac:spMkLst>
+        </pc:spChg>
+        <pc:spChg chg="add mod">
+          <ac:chgData name="Craig Brinkerhoff" userId="4ca67c74-3213-4250-9c32-077ebf257a4d" providerId="ADAL" clId="{19715C1B-6A5C-4480-830B-1128DB660155}" dt="2021-09-10T21:42:36.042" v="8615" actId="20577"/>
+          <ac:spMkLst>
+            <pc:docMk/>
+            <pc:sldMk cId="3557711385" sldId="266"/>
+            <ac:spMk id="3" creationId="{4A4E8022-2800-4DD6-9F04-A7C2FAEA2AD4}"/>
+          </ac:spMkLst>
+        </pc:spChg>
+        <pc:spChg chg="add mod">
+          <ac:chgData name="Craig Brinkerhoff" userId="4ca67c74-3213-4250-9c32-077ebf257a4d" providerId="ADAL" clId="{19715C1B-6A5C-4480-830B-1128DB660155}" dt="2021-09-10T21:42:40.207" v="8618" actId="403"/>
+          <ac:spMkLst>
+            <pc:docMk/>
+            <pc:sldMk cId="3557711385" sldId="266"/>
+            <ac:spMk id="4" creationId="{6555B11F-BF57-4408-AF7C-7631467B64DA}"/>
+          </ac:spMkLst>
+        </pc:spChg>
+        <pc:spChg chg="add del mod">
+          <ac:chgData name="Craig Brinkerhoff" userId="4ca67c74-3213-4250-9c32-077ebf257a4d" providerId="ADAL" clId="{19715C1B-6A5C-4480-830B-1128DB660155}" dt="2021-09-10T21:43:06.808" v="8621" actId="478"/>
+          <ac:spMkLst>
+            <pc:docMk/>
+            <pc:sldMk cId="3557711385" sldId="266"/>
+            <ac:spMk id="6" creationId="{E1AAFC3B-1ABC-4F0C-BE42-BD69D8AC5A70}"/>
+          </ac:spMkLst>
+        </pc:spChg>
+        <pc:spChg chg="add del mod">
+          <ac:chgData name="Craig Brinkerhoff" userId="4ca67c74-3213-4250-9c32-077ebf257a4d" providerId="ADAL" clId="{19715C1B-6A5C-4480-830B-1128DB660155}" dt="2021-09-10T21:43:46.721" v="8639"/>
+          <ac:spMkLst>
+            <pc:docMk/>
+            <pc:sldMk cId="3557711385" sldId="266"/>
+            <ac:spMk id="8" creationId="{94E202C9-6D7F-4533-9841-1BF11F81B62F}"/>
+          </ac:spMkLst>
+        </pc:spChg>
+        <pc:spChg chg="add mod">
+          <ac:chgData name="Craig Brinkerhoff" userId="4ca67c74-3213-4250-9c32-077ebf257a4d" providerId="ADAL" clId="{19715C1B-6A5C-4480-830B-1128DB660155}" dt="2021-09-10T22:14:59.156" v="9195" actId="20577"/>
+          <ac:spMkLst>
+            <pc:docMk/>
+            <pc:sldMk cId="3557711385" sldId="266"/>
+            <ac:spMk id="9" creationId="{85DA0AD0-BD1D-4130-AD2E-065E3F050122}"/>
+          </ac:spMkLst>
+        </pc:spChg>
+        <pc:spChg chg="add mod">
+          <ac:chgData name="Craig Brinkerhoff" userId="4ca67c74-3213-4250-9c32-077ebf257a4d" providerId="ADAL" clId="{19715C1B-6A5C-4480-830B-1128DB660155}" dt="2021-09-10T21:44:49.131" v="8684" actId="1076"/>
+          <ac:spMkLst>
+            <pc:docMk/>
+            <pc:sldMk cId="3557711385" sldId="266"/>
+            <ac:spMk id="11" creationId="{1959BFEB-D27C-4B58-9E10-821D99C105B4}"/>
+          </ac:spMkLst>
+        </pc:spChg>
+        <pc:spChg chg="add mod">
+          <ac:chgData name="Craig Brinkerhoff" userId="4ca67c74-3213-4250-9c32-077ebf257a4d" providerId="ADAL" clId="{19715C1B-6A5C-4480-830B-1128DB660155}" dt="2021-09-10T21:44:50.899" v="8685" actId="1076"/>
+          <ac:spMkLst>
+            <pc:docMk/>
+            <pc:sldMk cId="3557711385" sldId="266"/>
+            <ac:spMk id="12" creationId="{C40FD47F-0346-4C14-8DA0-5FE18D97EE83}"/>
+          </ac:spMkLst>
+        </pc:spChg>
+        <pc:picChg chg="add mod modCrop">
+          <ac:chgData name="Craig Brinkerhoff" userId="4ca67c74-3213-4250-9c32-077ebf257a4d" providerId="ADAL" clId="{19715C1B-6A5C-4480-830B-1128DB660155}" dt="2021-09-10T21:45:31.668" v="8692" actId="732"/>
+          <ac:picMkLst>
+            <pc:docMk/>
+            <pc:sldMk cId="3557711385" sldId="266"/>
+            <ac:picMk id="10" creationId="{A21BA237-46F8-48DD-8015-508BAC7FCFEF}"/>
+          </ac:picMkLst>
+        </pc:picChg>
       </pc:sldChg>
     </pc:docChg>
   </pc:docChgLst>
@@ -940,7 +1096,7 @@
           <a:p>
             <a:fld id="{7AF9CD04-3810-4932-AF98-2D8DC1E115D4}" type="datetimeFigureOut">
               <a:rPr lang="en-US" smtClean="0"/>
-              <a:t>9/9/2021</a:t>
+              <a:t>9/10/2021</a:t>
             </a:fld>
             <a:endParaRPr lang="en-US"/>
           </a:p>
@@ -1138,7 +1294,7 @@
           <a:p>
             <a:fld id="{7AF9CD04-3810-4932-AF98-2D8DC1E115D4}" type="datetimeFigureOut">
               <a:rPr lang="en-US" smtClean="0"/>
-              <a:t>9/9/2021</a:t>
+              <a:t>9/10/2021</a:t>
             </a:fld>
             <a:endParaRPr lang="en-US"/>
           </a:p>
@@ -1346,7 +1502,7 @@
           <a:p>
             <a:fld id="{7AF9CD04-3810-4932-AF98-2D8DC1E115D4}" type="datetimeFigureOut">
               <a:rPr lang="en-US" smtClean="0"/>
-              <a:t>9/9/2021</a:t>
+              <a:t>9/10/2021</a:t>
             </a:fld>
             <a:endParaRPr lang="en-US"/>
           </a:p>
@@ -1544,7 +1700,7 @@
           <a:p>
             <a:fld id="{7AF9CD04-3810-4932-AF98-2D8DC1E115D4}" type="datetimeFigureOut">
               <a:rPr lang="en-US" smtClean="0"/>
-              <a:t>9/9/2021</a:t>
+              <a:t>9/10/2021</a:t>
             </a:fld>
             <a:endParaRPr lang="en-US"/>
           </a:p>
@@ -1819,7 +1975,7 @@
           <a:p>
             <a:fld id="{7AF9CD04-3810-4932-AF98-2D8DC1E115D4}" type="datetimeFigureOut">
               <a:rPr lang="en-US" smtClean="0"/>
-              <a:t>9/9/2021</a:t>
+              <a:t>9/10/2021</a:t>
             </a:fld>
             <a:endParaRPr lang="en-US"/>
           </a:p>
@@ -2084,7 +2240,7 @@
           <a:p>
             <a:fld id="{7AF9CD04-3810-4932-AF98-2D8DC1E115D4}" type="datetimeFigureOut">
               <a:rPr lang="en-US" smtClean="0"/>
-              <a:t>9/9/2021</a:t>
+              <a:t>9/10/2021</a:t>
             </a:fld>
             <a:endParaRPr lang="en-US"/>
           </a:p>
@@ -2496,7 +2652,7 @@
           <a:p>
             <a:fld id="{7AF9CD04-3810-4932-AF98-2D8DC1E115D4}" type="datetimeFigureOut">
               <a:rPr lang="en-US" smtClean="0"/>
-              <a:t>9/9/2021</a:t>
+              <a:t>9/10/2021</a:t>
             </a:fld>
             <a:endParaRPr lang="en-US"/>
           </a:p>
@@ -2637,7 +2793,7 @@
           <a:p>
             <a:fld id="{7AF9CD04-3810-4932-AF98-2D8DC1E115D4}" type="datetimeFigureOut">
               <a:rPr lang="en-US" smtClean="0"/>
-              <a:t>9/9/2021</a:t>
+              <a:t>9/10/2021</a:t>
             </a:fld>
             <a:endParaRPr lang="en-US"/>
           </a:p>
@@ -2750,7 +2906,7 @@
           <a:p>
             <a:fld id="{7AF9CD04-3810-4932-AF98-2D8DC1E115D4}" type="datetimeFigureOut">
               <a:rPr lang="en-US" smtClean="0"/>
-              <a:t>9/9/2021</a:t>
+              <a:t>9/10/2021</a:t>
             </a:fld>
             <a:endParaRPr lang="en-US"/>
           </a:p>
@@ -3061,7 +3217,7 @@
           <a:p>
             <a:fld id="{7AF9CD04-3810-4932-AF98-2D8DC1E115D4}" type="datetimeFigureOut">
               <a:rPr lang="en-US" smtClean="0"/>
-              <a:t>9/9/2021</a:t>
+              <a:t>9/10/2021</a:t>
             </a:fld>
             <a:endParaRPr lang="en-US"/>
           </a:p>
@@ -3349,7 +3505,7 @@
           <a:p>
             <a:fld id="{7AF9CD04-3810-4932-AF98-2D8DC1E115D4}" type="datetimeFigureOut">
               <a:rPr lang="en-US" smtClean="0"/>
-              <a:t>9/9/2021</a:t>
+              <a:t>9/10/2021</a:t>
             </a:fld>
             <a:endParaRPr lang="en-US"/>
           </a:p>
@@ -3590,7 +3746,7 @@
           <a:p>
             <a:fld id="{7AF9CD04-3810-4932-AF98-2D8DC1E115D4}" type="datetimeFigureOut">
               <a:rPr lang="en-US" smtClean="0"/>
-              <a:t>9/9/2021</a:t>
+              <a:t>9/10/2021</a:t>
             </a:fld>
             <a:endParaRPr lang="en-US"/>
           </a:p>
@@ -4060,7 +4216,9 @@
               </a:xfrm>
             </p:spPr>
             <p:txBody>
-              <a:bodyPr/>
+              <a:bodyPr>
+                <a:normAutofit/>
+              </a:bodyPr>
               <a:lstStyle/>
               <a:p>
                 <a:r>
@@ -4158,34 +4316,13 @@
                               </a:rPr>
                               <m:t>𝑣</m:t>
                             </m:r>
-                            <m:sSub>
-                              <m:sSubPr>
-                                <m:ctrlPr>
-                                  <a:rPr lang="en-US" sz="2800" b="0" i="1" smtClean="0">
-                                    <a:latin typeface="Cambria Math" panose="02040503050406030204" pitchFamily="18" charset="0"/>
-                                    <a:ea typeface="Cambria Math" panose="02040503050406030204" pitchFamily="18" charset="0"/>
-                                  </a:rPr>
-                                </m:ctrlPr>
-                              </m:sSubPr>
-                              <m:e>
-                                <m:r>
-                                  <a:rPr lang="en-US" sz="2800" b="0" i="1" smtClean="0">
-                                    <a:latin typeface="Cambria Math" panose="02040503050406030204" pitchFamily="18" charset="0"/>
-                                    <a:ea typeface="Cambria Math" panose="02040503050406030204" pitchFamily="18" charset="0"/>
-                                  </a:rPr>
-                                  <m:t>𝜀</m:t>
-                                </m:r>
-                              </m:e>
-                              <m:sub>
-                                <m:r>
-                                  <a:rPr lang="en-US" sz="2800" b="0" i="1" smtClean="0">
-                                    <a:latin typeface="Cambria Math" panose="02040503050406030204" pitchFamily="18" charset="0"/>
-                                    <a:ea typeface="Cambria Math" panose="02040503050406030204" pitchFamily="18" charset="0"/>
-                                  </a:rPr>
-                                  <m:t>𝐻</m:t>
-                                </m:r>
-                              </m:sub>
-                            </m:sSub>
+                            <m:r>
+                              <a:rPr lang="en-US" sz="2800" b="0" i="1" smtClean="0">
+                                <a:latin typeface="Cambria Math" panose="02040503050406030204" pitchFamily="18" charset="0"/>
+                                <a:ea typeface="Cambria Math" panose="02040503050406030204" pitchFamily="18" charset="0"/>
+                              </a:rPr>
+                              <m:t>𝜀</m:t>
+                            </m:r>
                           </m:e>
                         </m:d>
                       </m:e>
@@ -4245,34 +4382,13 @@
                 </a:r>
                 <a14:m>
                   <m:oMath xmlns:m="http://schemas.openxmlformats.org/officeDocument/2006/math">
-                    <m:sSub>
-                      <m:sSubPr>
-                        <m:ctrlPr>
-                          <a:rPr lang="en-US" b="0" i="1" smtClean="0">
-                            <a:latin typeface="Cambria Math" panose="02040503050406030204" pitchFamily="18" charset="0"/>
-                            <a:ea typeface="Cambria Math" panose="02040503050406030204" pitchFamily="18" charset="0"/>
-                          </a:rPr>
-                        </m:ctrlPr>
-                      </m:sSubPr>
-                      <m:e>
-                        <m:r>
-                          <a:rPr lang="en-US" i="1" smtClean="0">
-                            <a:latin typeface="Cambria Math" panose="02040503050406030204" pitchFamily="18" charset="0"/>
-                            <a:ea typeface="Cambria Math" panose="02040503050406030204" pitchFamily="18" charset="0"/>
-                          </a:rPr>
-                          <m:t>𝜀</m:t>
-                        </m:r>
-                      </m:e>
-                      <m:sub>
-                        <m:r>
-                          <a:rPr lang="en-US" b="0" i="1" smtClean="0">
-                            <a:latin typeface="Cambria Math" panose="02040503050406030204" pitchFamily="18" charset="0"/>
-                            <a:ea typeface="Cambria Math" panose="02040503050406030204" pitchFamily="18" charset="0"/>
-                          </a:rPr>
-                          <m:t>𝐻</m:t>
-                        </m:r>
-                      </m:sub>
-                    </m:sSub>
+                    <m:r>
+                      <a:rPr lang="en-US" b="0" i="1" smtClean="0">
+                        <a:latin typeface="Cambria Math" panose="02040503050406030204" pitchFamily="18" charset="0"/>
+                        <a:ea typeface="Cambria Math" panose="02040503050406030204" pitchFamily="18" charset="0"/>
+                      </a:rPr>
+                      <m:t>𝜀</m:t>
+                    </m:r>
                   </m:oMath>
                 </a14:m>
                 <a:endParaRPr lang="en-US" dirty="0"/>
@@ -4288,7 +4404,7 @@
                 <a:pPr lvl="2"/>
                 <a:r>
                   <a:rPr lang="en-US" dirty="0"/>
-                  <a:t>A common model (in rivers) is </a:t>
+                  <a:t>Another common model (in rivers) is </a:t>
                 </a:r>
                 <a14:m>
                   <m:oMath xmlns:m="http://schemas.openxmlformats.org/officeDocument/2006/math">
@@ -4354,6 +4470,44 @@
                         </m:r>
                       </m:e>
                     </m:acc>
+                    <m:r>
+                      <a:rPr lang="en-US" b="0" i="1" smtClean="0">
+                        <a:latin typeface="Cambria Math" panose="02040503050406030204" pitchFamily="18" charset="0"/>
+                        <a:ea typeface="Cambria Math" panose="02040503050406030204" pitchFamily="18" charset="0"/>
+                      </a:rPr>
+                      <m:t>=</m:t>
+                    </m:r>
+                    <m:f>
+                      <m:fPr>
+                        <m:ctrlPr>
+                          <a:rPr lang="en-US" b="0" i="1" smtClean="0">
+                            <a:latin typeface="Cambria Math" panose="02040503050406030204" pitchFamily="18" charset="0"/>
+                            <a:ea typeface="Cambria Math" panose="02040503050406030204" pitchFamily="18" charset="0"/>
+                          </a:rPr>
+                        </m:ctrlPr>
+                      </m:fPr>
+                      <m:num>
+                        <m:r>
+                          <m:rPr>
+                            <m:sty m:val="p"/>
+                          </m:rPr>
+                          <a:rPr lang="el-GR" b="0" i="1" smtClean="0">
+                            <a:latin typeface="Cambria Math" panose="02040503050406030204" pitchFamily="18" charset="0"/>
+                            <a:ea typeface="Cambria Math" panose="02040503050406030204" pitchFamily="18" charset="0"/>
+                          </a:rPr>
+                          <m:t>Ω</m:t>
+                        </m:r>
+                      </m:num>
+                      <m:den>
+                        <m:r>
+                          <a:rPr lang="en-US" b="0" i="1" smtClean="0">
+                            <a:latin typeface="Cambria Math" panose="02040503050406030204" pitchFamily="18" charset="0"/>
+                            <a:ea typeface="Cambria Math" panose="02040503050406030204" pitchFamily="18" charset="0"/>
+                          </a:rPr>
+                          <m:t>𝑚𝑎𝑠𝑠</m:t>
+                        </m:r>
+                      </m:den>
+                    </m:f>
                   </m:oMath>
                 </a14:m>
                 <a:r>
@@ -4393,15 +4547,10 @@
               <a:p>
                 <a:pPr lvl="3"/>
                 <a:r>
-                  <a:rPr lang="en-US" dirty="0"/>
-                  <a:t>Assumes that all depth-scale turbulent production eventually masks its way down the energy cascade and is dissipated and so just uses stream power to reflect ‘form drag/shear’ via meanders, bed forms, channel geometry, etc. rather than just from the bed (the model usually used in lentic waters)</a:t>
-                </a:r>
-              </a:p>
-              <a:p>
-                <a:pPr lvl="3"/>
-                <a:r>
-                  <a:rPr lang="en-US" dirty="0"/>
-                  <a:t>BUT, </a:t>
+                  <a:rPr lang="en-US" dirty="0">
+                    <a:ea typeface="Cambria Math" panose="02040503050406030204" pitchFamily="18" charset="0"/>
+                  </a:rPr>
+                  <a:t>Depth-scale form-drag (i.e. meanders, bars, riverbanks, etc.) enhances turbulence production/dissipation relative to other aquatic systems. Meaning, that </a:t>
                 </a:r>
                 <a14:m>
                   <m:oMath xmlns:m="http://schemas.openxmlformats.org/officeDocument/2006/math">
@@ -4436,8 +4585,17 @@
                   </m:oMath>
                 </a14:m>
                 <a:r>
+                  <a:rPr lang="en-US" b="0" dirty="0">
+                    <a:ea typeface="Cambria Math" panose="02040503050406030204" pitchFamily="18" charset="0"/>
+                  </a:rPr>
+                  <a:t> is a depth-scale dissipation term and is not necessarily reflective of the near-surface dissipation rate</a:t>
+                </a:r>
+              </a:p>
+              <a:p>
+                <a:pPr lvl="4"/>
+                <a:r>
                   <a:rPr lang="en-US" dirty="0"/>
-                  <a:t> is not necessarily indicative of near-surface turbulence as it is calculated across the depth-scale</a:t>
+                  <a:t>Stream power is over the entire depth, and we calculate this using reach-averaged velocity, not surface velocity</a:t>
                 </a:r>
               </a:p>
               <a:p>
@@ -4674,105 +4832,6 @@
           <a:chExt cx="0" cy="0"/>
         </a:xfrm>
       </p:grpSpPr>
-      <p:pic>
-        <p:nvPicPr>
-          <p:cNvPr id="2050" name="Picture 2" descr="Channels | S-cool, the revision website">
-            <a:extLst>
-              <a:ext uri="{FF2B5EF4-FFF2-40B4-BE49-F238E27FC236}">
-                <a16:creationId xmlns:a16="http://schemas.microsoft.com/office/drawing/2014/main" id="{18407930-64D2-47D0-8227-3D2812A2581F}"/>
-              </a:ext>
-            </a:extLst>
-          </p:cNvPr>
-          <p:cNvPicPr>
-            <a:picLocks noChangeAspect="1" noChangeArrowheads="1"/>
-          </p:cNvPicPr>
-          <p:nvPr/>
-        </p:nvPicPr>
-        <p:blipFill>
-          <a:blip r:embed="rId2">
-            <a:extLst>
-              <a:ext uri="{28A0092B-C50C-407E-A947-70E740481C1C}">
-                <a14:useLocalDpi xmlns:a14="http://schemas.microsoft.com/office/drawing/2010/main" val="0"/>
-              </a:ext>
-            </a:extLst>
-          </a:blip>
-          <a:srcRect/>
-          <a:stretch>
-            <a:fillRect/>
-          </a:stretch>
-        </p:blipFill>
-        <p:spPr bwMode="auto">
-          <a:xfrm>
-            <a:off x="290388" y="710513"/>
-            <a:ext cx="4384514" cy="3955170"/>
-          </a:xfrm>
-          <a:prstGeom prst="rect">
-            <a:avLst/>
-          </a:prstGeom>
-          <a:noFill/>
-          <a:extLst>
-            <a:ext uri="{909E8E84-426E-40DD-AFC4-6F175D3DCCD1}">
-              <a14:hiddenFill xmlns:a14="http://schemas.microsoft.com/office/drawing/2010/main">
-                <a:solidFill>
-                  <a:srgbClr val="FFFFFF"/>
-                </a:solidFill>
-              </a14:hiddenFill>
-            </a:ext>
-          </a:extLst>
-        </p:spPr>
-      </p:pic>
-      <p:sp>
-        <p:nvSpPr>
-          <p:cNvPr id="2" name="Rectangle 1">
-            <a:extLst>
-              <a:ext uri="{FF2B5EF4-FFF2-40B4-BE49-F238E27FC236}">
-                <a16:creationId xmlns:a16="http://schemas.microsoft.com/office/drawing/2014/main" id="{4B6BD9D8-2686-45C7-9439-0F8FDA7CB5F1}"/>
-              </a:ext>
-            </a:extLst>
-          </p:cNvPr>
-          <p:cNvSpPr/>
-          <p:nvPr/>
-        </p:nvSpPr>
-        <p:spPr>
-          <a:xfrm>
-            <a:off x="2574924" y="1375794"/>
-            <a:ext cx="85725" cy="151002"/>
-          </a:xfrm>
-          <a:prstGeom prst="rect">
-            <a:avLst/>
-          </a:prstGeom>
-          <a:solidFill>
-            <a:srgbClr val="8EC1FE"/>
-          </a:solidFill>
-          <a:ln>
-            <a:noFill/>
-          </a:ln>
-        </p:spPr>
-        <p:style>
-          <a:lnRef idx="2">
-            <a:schemeClr val="accent1">
-              <a:shade val="50000"/>
-            </a:schemeClr>
-          </a:lnRef>
-          <a:fillRef idx="1">
-            <a:schemeClr val="accent1"/>
-          </a:fillRef>
-          <a:effectRef idx="0">
-            <a:schemeClr val="accent1"/>
-          </a:effectRef>
-          <a:fontRef idx="minor">
-            <a:schemeClr val="lt1"/>
-          </a:fontRef>
-        </p:style>
-        <p:txBody>
-          <a:bodyPr rtlCol="0" anchor="ctr"/>
-          <a:lstStyle/>
-          <a:p>
-            <a:pPr algn="ctr"/>
-            <a:endParaRPr lang="en-US"/>
-          </a:p>
-        </p:txBody>
-      </p:sp>
       <mc:AlternateContent xmlns:mc="http://schemas.openxmlformats.org/markup-compatibility/2006">
         <mc:Choice xmlns:a14="http://schemas.microsoft.com/office/drawing/2010/main" Requires="a14">
           <p:sp>
@@ -4789,8 +4848,8 @@
             </p:nvSpPr>
             <p:spPr>
               <a:xfrm>
-                <a:off x="4674902" y="1001340"/>
-                <a:ext cx="7517097" cy="3046988"/>
+                <a:off x="394283" y="3917659"/>
+                <a:ext cx="11210488" cy="2748466"/>
               </a:xfrm>
               <a:prstGeom prst="rect">
                 <a:avLst/>
@@ -4837,7 +4896,7 @@
                 </a14:m>
                 <a:r>
                   <a:rPr lang="en-US" sz="2400" dirty="0"/>
-                  <a:t> is scale-dependent: form-drag dissipation only effects </a:t>
+                  <a:t> is scale-dependent: what is considered form-drag is relative to the depth, and form-drag dissipation only effects </a:t>
                 </a:r>
                 <a:r>
                   <a:rPr lang="en-US" sz="2400" i="1" dirty="0"/>
@@ -4873,7 +4932,7 @@
                 </a:r>
                 <a:r>
                   <a:rPr lang="en-US" sz="2400" dirty="0"/>
-                  <a:t>, which is more likely if the depth-scale is smaller (all else equal).</a:t>
+                  <a:t>, which is more likely if the depth-scale is smaller (all else held equal).</a:t>
                 </a:r>
               </a:p>
               <a:p>
@@ -4890,11 +4949,15 @@
                       <a:schemeClr val="tx1"/>
                     </a:solidFill>
                   </a:rPr>
-                  <a:t>Put another way, an “inefficient channel” generates more form drag that more </a:t>
-                </a:r>
-                <a:r>
-                  <a:rPr lang="en-US" sz="2400" dirty="0"/>
-                  <a:t>readily reaches the surface, </a:t>
+                  <a:t>Put another way, an “inefficient channel” 1) generates more form drag </a:t>
+                </a:r>
+                <a:r>
+                  <a:rPr lang="en-US" sz="2400" dirty="0">
+                    <a:solidFill>
+                      <a:srgbClr val="FF0000"/>
+                    </a:solidFill>
+                  </a:rPr>
+                  <a:t>[Chow 1959]</a:t>
                 </a:r>
                 <a:r>
                   <a:rPr lang="en-US" sz="2400" dirty="0">
@@ -4902,7 +4965,31 @@
                       <a:schemeClr val="tx1"/>
                     </a:solidFill>
                   </a:rPr>
-                  <a:t>therefore exerting a greater influence on </a:t>
+                  <a:t> </a:t>
+                </a:r>
+                <a:r>
+                  <a:rPr lang="en-US" sz="2400" dirty="0"/>
+                  <a:t>and 2) form-drag turbulence </a:t>
+                </a:r>
+                <a:r>
+                  <a:rPr lang="en-US" sz="2400" dirty="0">
+                    <a:solidFill>
+                      <a:schemeClr val="tx1"/>
+                    </a:solidFill>
+                  </a:rPr>
+                  <a:t>more </a:t>
+                </a:r>
+                <a:r>
+                  <a:rPr lang="en-US" sz="2400" dirty="0"/>
+                  <a:t>readily reaches the surface.</a:t>
+                </a:r>
+                <a:r>
+                  <a:rPr lang="en-US" sz="2400" dirty="0">
+                    <a:solidFill>
+                      <a:schemeClr val="tx1"/>
+                    </a:solidFill>
+                  </a:rPr>
+                  <a:t> So, </a:t>
                 </a:r>
                 <a14:m>
                   <m:oMath xmlns:m="http://schemas.openxmlformats.org/officeDocument/2006/math">
@@ -4939,7 +5026,7 @@
                             <a:latin typeface="Cambria Math" panose="02040503050406030204" pitchFamily="18" charset="0"/>
                             <a:ea typeface="Cambria Math" panose="02040503050406030204" pitchFamily="18" charset="0"/>
                           </a:rPr>
-                          <m:t>𝐻</m:t>
+                          <m:t>𝐷</m:t>
                         </m:r>
                       </m:sub>
                     </m:sSub>
@@ -4951,7 +5038,56 @@
                       <a:schemeClr val="tx1"/>
                     </a:solidFill>
                   </a:rPr>
-                  <a:t> than an efficient channel with the same flow</a:t>
+                  <a:t> should exert a greater influence on surface dissipation (</a:t>
+                </a:r>
+                <a14:m>
+                  <m:oMath xmlns:m="http://schemas.openxmlformats.org/officeDocument/2006/math">
+                    <m:sSub>
+                      <m:sSubPr>
+                        <m:ctrlPr>
+                          <a:rPr lang="en-US" sz="2400" b="0" i="1" smtClean="0">
+                            <a:solidFill>
+                              <a:schemeClr val="tx1"/>
+                            </a:solidFill>
+                            <a:latin typeface="Cambria Math" panose="02040503050406030204" pitchFamily="18" charset="0"/>
+                            <a:ea typeface="Cambria Math" panose="02040503050406030204" pitchFamily="18" charset="0"/>
+                          </a:rPr>
+                        </m:ctrlPr>
+                      </m:sSubPr>
+                      <m:e>
+                        <m:r>
+                          <a:rPr lang="en-US" sz="2400" i="1" smtClean="0">
+                            <a:solidFill>
+                              <a:schemeClr val="tx1"/>
+                            </a:solidFill>
+                            <a:latin typeface="Cambria Math" panose="02040503050406030204" pitchFamily="18" charset="0"/>
+                            <a:ea typeface="Cambria Math" panose="02040503050406030204" pitchFamily="18" charset="0"/>
+                          </a:rPr>
+                          <m:t>𝜀</m:t>
+                        </m:r>
+                      </m:e>
+                      <m:sub>
+                        <m:r>
+                          <a:rPr lang="en-US" sz="2400" b="0" i="1" smtClean="0">
+                            <a:solidFill>
+                              <a:schemeClr val="tx1"/>
+                            </a:solidFill>
+                            <a:latin typeface="Cambria Math" panose="02040503050406030204" pitchFamily="18" charset="0"/>
+                            <a:ea typeface="Cambria Math" panose="02040503050406030204" pitchFamily="18" charset="0"/>
+                          </a:rPr>
+                          <m:t>𝑆</m:t>
+                        </m:r>
+                      </m:sub>
+                    </m:sSub>
+                  </m:oMath>
+                </a14:m>
+                <a:r>
+                  <a:rPr lang="en-US" sz="2400" dirty="0">
+                    <a:solidFill>
+                      <a:schemeClr val="tx1"/>
+                    </a:solidFill>
+                  </a:rPr>
+                  <a:t>) than in an efficient channel with the same flow</a:t>
                 </a:r>
               </a:p>
             </p:txBody>
@@ -4974,16 +5110,16 @@
             </p:nvSpPr>
             <p:spPr>
               <a:xfrm>
-                <a:off x="4674902" y="1001340"/>
-                <a:ext cx="7517097" cy="3046988"/>
+                <a:off x="394283" y="3917659"/>
+                <a:ext cx="11210488" cy="2748466"/>
               </a:xfrm>
               <a:prstGeom prst="rect">
                 <a:avLst/>
               </a:prstGeom>
               <a:blipFill>
-                <a:blip r:embed="rId3"/>
+                <a:blip r:embed="rId2"/>
                 <a:stretch>
-                  <a:fillRect l="-1298" t="-1600" r="-1865" b="-3600"/>
+                  <a:fillRect l="-870" t="-1774" b="-1552"/>
                 </a:stretch>
               </a:blipFill>
             </p:spPr>
@@ -5002,14 +5138,80 @@
           </p:sp>
         </mc:Fallback>
       </mc:AlternateContent>
+      <p:pic>
+        <p:nvPicPr>
+          <p:cNvPr id="4" name="Picture 3" descr="A picture containing diagram&#10;&#10;Description automatically generated">
+            <a:extLst>
+              <a:ext uri="{FF2B5EF4-FFF2-40B4-BE49-F238E27FC236}">
+                <a16:creationId xmlns:a16="http://schemas.microsoft.com/office/drawing/2014/main" id="{EBF82825-B6F8-4711-831E-5FF12A7329B8}"/>
+              </a:ext>
+            </a:extLst>
+          </p:cNvPr>
+          <p:cNvPicPr>
+            <a:picLocks noChangeAspect="1"/>
+          </p:cNvPicPr>
+          <p:nvPr/>
+        </p:nvPicPr>
+        <p:blipFill>
+          <a:blip r:embed="rId3">
+            <a:extLst>
+              <a:ext uri="{28A0092B-C50C-407E-A947-70E740481C1C}">
+                <a14:useLocalDpi xmlns:a14="http://schemas.microsoft.com/office/drawing/2010/main" val="0"/>
+              </a:ext>
+            </a:extLst>
+          </a:blip>
+          <a:stretch>
+            <a:fillRect/>
+          </a:stretch>
+        </p:blipFill>
+        <p:spPr>
+          <a:xfrm>
+            <a:off x="2558641" y="165071"/>
+            <a:ext cx="6322196" cy="3544786"/>
+          </a:xfrm>
+          <a:prstGeom prst="rect">
+            <a:avLst/>
+          </a:prstGeom>
+        </p:spPr>
+      </p:pic>
+    </p:spTree>
+    <p:extLst>
+      <p:ext uri="{BB962C8B-B14F-4D97-AF65-F5344CB8AC3E}">
+        <p14:creationId xmlns:p14="http://schemas.microsoft.com/office/powerpoint/2010/main" val="3578953865"/>
+      </p:ext>
+    </p:extLst>
+  </p:cSld>
+  <p:clrMapOvr>
+    <a:masterClrMapping/>
+  </p:clrMapOvr>
+</p:sld>
+</file>
+
+<file path=ppt/slides/slide3.xml><?xml version="1.0" encoding="utf-8"?>
+<p:sld xmlns:a="http://schemas.openxmlformats.org/drawingml/2006/main" xmlns:r="http://schemas.openxmlformats.org/officeDocument/2006/relationships" xmlns:p="http://schemas.openxmlformats.org/presentationml/2006/main">
+  <p:cSld>
+    <p:spTree>
+      <p:nvGrpSpPr>
+        <p:cNvPr id="1" name=""/>
+        <p:cNvGrpSpPr/>
+        <p:nvPr/>
+      </p:nvGrpSpPr>
+      <p:grpSpPr>
+        <a:xfrm>
+          <a:off x="0" y="0"/>
+          <a:ext cx="0" cy="0"/>
+          <a:chOff x="0" y="0"/>
+          <a:chExt cx="0" cy="0"/>
+        </a:xfrm>
+      </p:grpSpPr>
       <mc:AlternateContent xmlns:mc="http://schemas.openxmlformats.org/markup-compatibility/2006">
         <mc:Choice xmlns:a14="http://schemas.microsoft.com/office/drawing/2010/main" Requires="a14">
           <p:sp>
             <p:nvSpPr>
-              <p:cNvPr id="9" name="TextBox 8">
+              <p:cNvPr id="3" name="TextBox 2">
                 <a:extLst>
                   <a:ext uri="{FF2B5EF4-FFF2-40B4-BE49-F238E27FC236}">
-                    <a16:creationId xmlns:a16="http://schemas.microsoft.com/office/drawing/2014/main" id="{153A8796-5559-42AC-90D0-77E5A4B1CB5A}"/>
+                    <a16:creationId xmlns:a16="http://schemas.microsoft.com/office/drawing/2014/main" id="{4A4E8022-2800-4DD6-9F04-A7C2FAEA2AD4}"/>
                   </a:ext>
                 </a:extLst>
               </p:cNvPr>
@@ -5018,8 +5220,8 @@
             </p:nvSpPr>
             <p:spPr>
               <a:xfrm>
-                <a:off x="532701" y="4694659"/>
-                <a:ext cx="11659298" cy="1349216"/>
+                <a:off x="532702" y="307217"/>
+                <a:ext cx="11659298" cy="979884"/>
               </a:xfrm>
               <a:prstGeom prst="rect">
                 <a:avLst/>
@@ -5034,7 +5236,7 @@
               <a:p>
                 <a:r>
                   <a:rPr lang="en-US" sz="2400" b="1" dirty="0"/>
-                  <a:t>SO, we hypothesize that </a:t>
+                  <a:t>SO, I hypothesize that </a:t>
                 </a:r>
                 <a14:m>
                   <m:oMath xmlns:m="http://schemas.openxmlformats.org/officeDocument/2006/math">
@@ -5193,8 +5395,63 @@
                 </a:r>
                 <a:r>
                   <a:rPr lang="en-US" sz="2400" b="1" dirty="0"/>
-                  <a:t>is largely from form drag. Maximal inefficiency happens when hydraulic radius and depth are nearly equivalent (Stream B)</a:t>
-                </a:r>
+                  <a:t>is largely from form drag (i.e. </a:t>
+                </a:r>
+                <a14:m>
+                  <m:oMath xmlns:m="http://schemas.openxmlformats.org/officeDocument/2006/math">
+                    <m:r>
+                      <a:rPr lang="en-US" sz="2400" b="1" i="1" smtClean="0">
+                        <a:latin typeface="Cambria Math" panose="02040503050406030204" pitchFamily="18" charset="0"/>
+                        <a:ea typeface="Cambria Math" panose="02040503050406030204" pitchFamily="18" charset="0"/>
+                      </a:rPr>
+                      <m:t>𝜺</m:t>
+                    </m:r>
+                    <m:r>
+                      <a:rPr lang="en-US" sz="2400" b="1" i="1" smtClean="0">
+                        <a:latin typeface="Cambria Math" panose="02040503050406030204" pitchFamily="18" charset="0"/>
+                        <a:ea typeface="Cambria Math" panose="02040503050406030204" pitchFamily="18" charset="0"/>
+                      </a:rPr>
+                      <m:t>≈</m:t>
+                    </m:r>
+                    <m:sSub>
+                      <m:sSubPr>
+                        <m:ctrlPr>
+                          <a:rPr lang="en-US" sz="2400" b="1" i="1" smtClean="0">
+                            <a:latin typeface="Cambria Math" panose="02040503050406030204" pitchFamily="18" charset="0"/>
+                            <a:ea typeface="Cambria Math" panose="02040503050406030204" pitchFamily="18" charset="0"/>
+                          </a:rPr>
+                        </m:ctrlPr>
+                      </m:sSubPr>
+                      <m:e>
+                        <m:r>
+                          <a:rPr lang="en-US" sz="2400" b="1" i="1" smtClean="0">
+                            <a:latin typeface="Cambria Math" panose="02040503050406030204" pitchFamily="18" charset="0"/>
+                            <a:ea typeface="Cambria Math" panose="02040503050406030204" pitchFamily="18" charset="0"/>
+                          </a:rPr>
+                          <m:t>𝜺</m:t>
+                        </m:r>
+                      </m:e>
+                      <m:sub>
+                        <m:r>
+                          <a:rPr lang="en-US" sz="2400" b="1" i="1" smtClean="0">
+                            <a:latin typeface="Cambria Math" panose="02040503050406030204" pitchFamily="18" charset="0"/>
+                            <a:ea typeface="Cambria Math" panose="02040503050406030204" pitchFamily="18" charset="0"/>
+                          </a:rPr>
+                          <m:t>𝑫</m:t>
+                        </m:r>
+                      </m:sub>
+                    </m:sSub>
+                  </m:oMath>
+                </a14:m>
+                <a:r>
+                  <a:rPr lang="en-US" sz="2400" b="1" dirty="0"/>
+                  <a:t>).</a:t>
+                </a:r>
+                <a:endParaRPr lang="en-US" sz="2400" b="1" dirty="0">
+                  <a:solidFill>
+                    <a:srgbClr val="FF0000"/>
+                  </a:solidFill>
+                </a:endParaRPr>
               </a:p>
             </p:txBody>
           </p:sp>
@@ -5202,10 +5459,10 @@
         <mc:Fallback>
           <p:sp>
             <p:nvSpPr>
-              <p:cNvPr id="9" name="TextBox 8">
+              <p:cNvPr id="3" name="TextBox 2">
                 <a:extLst>
                   <a:ext uri="{FF2B5EF4-FFF2-40B4-BE49-F238E27FC236}">
-                    <a16:creationId xmlns:a16="http://schemas.microsoft.com/office/drawing/2014/main" id="{153A8796-5559-42AC-90D0-77E5A4B1CB5A}"/>
+                    <a16:creationId xmlns:a16="http://schemas.microsoft.com/office/drawing/2014/main" id="{4A4E8022-2800-4DD6-9F04-A7C2FAEA2AD4}"/>
                   </a:ext>
                 </a:extLst>
               </p:cNvPr>
@@ -5216,16 +5473,16 @@
             </p:nvSpPr>
             <p:spPr>
               <a:xfrm>
-                <a:off x="532701" y="4694659"/>
-                <a:ext cx="11659298" cy="1349216"/>
+                <a:off x="532702" y="307217"/>
+                <a:ext cx="11659298" cy="979884"/>
               </a:xfrm>
               <a:prstGeom prst="rect">
                 <a:avLst/>
               </a:prstGeom>
               <a:blipFill>
-                <a:blip r:embed="rId4"/>
+                <a:blip r:embed="rId2"/>
                 <a:stretch>
-                  <a:fillRect l="-784" b="-9502"/>
+                  <a:fillRect l="-784" r="-1411" b="-13043"/>
                 </a:stretch>
               </a:blipFill>
             </p:spPr>
@@ -5248,10 +5505,10 @@
         <mc:Choice xmlns:a14="http://schemas.microsoft.com/office/drawing/2010/main" Requires="a14">
           <p:sp>
             <p:nvSpPr>
-              <p:cNvPr id="11" name="TextBox 10">
+              <p:cNvPr id="4" name="TextBox 3">
                 <a:extLst>
                   <a:ext uri="{FF2B5EF4-FFF2-40B4-BE49-F238E27FC236}">
-                    <a16:creationId xmlns:a16="http://schemas.microsoft.com/office/drawing/2014/main" id="{37731284-2C69-47F0-859C-CE4AD7B17468}"/>
+                    <a16:creationId xmlns:a16="http://schemas.microsoft.com/office/drawing/2014/main" id="{6555B11F-BF57-4408-AF7C-7631467B64DA}"/>
                   </a:ext>
                 </a:extLst>
               </p:cNvPr>
@@ -5260,8 +5517,8 @@
             </p:nvSpPr>
             <p:spPr>
               <a:xfrm>
-                <a:off x="532700" y="6043875"/>
-                <a:ext cx="11030649" cy="646331"/>
+                <a:off x="541090" y="1547376"/>
+                <a:ext cx="11030649" cy="830997"/>
               </a:xfrm>
               <a:prstGeom prst="rect">
                 <a:avLst/>
@@ -5275,23 +5532,167 @@
               <a:lstStyle/>
               <a:p>
                 <a:r>
-                  <a:rPr lang="en-US" b="1" dirty="0"/>
+                  <a:rPr lang="en-US" sz="2400" b="1" dirty="0"/>
                   <a:t>Further, if this is true, then we likely don’t need the small-eddy model and can predict k directly using depth-scale turbulence (i.e. </a:t>
                 </a:r>
                 <a14:m>
                   <m:oMath xmlns:m="http://schemas.openxmlformats.org/officeDocument/2006/math">
                     <m:r>
-                      <a:rPr lang="en-US" b="1" i="1" smtClean="0">
+                      <a:rPr lang="en-US" sz="2400" b="1" i="1" smtClean="0">
                         <a:latin typeface="Cambria Math" panose="02040503050406030204" pitchFamily="18" charset="0"/>
                       </a:rPr>
                       <m:t>𝒌</m:t>
                     </m:r>
                     <m:r>
-                      <a:rPr lang="en-US" b="1" i="1" smtClean="0">
+                      <a:rPr lang="en-US" sz="2400" b="1" i="1" smtClean="0">
                         <a:latin typeface="Cambria Math" panose="02040503050406030204" pitchFamily="18" charset="0"/>
                       </a:rPr>
                       <m:t>~</m:t>
                     </m:r>
+                    <m:sSub>
+                      <m:sSubPr>
+                        <m:ctrlPr>
+                          <a:rPr lang="en-US" sz="2400" b="1" i="1" smtClean="0">
+                            <a:latin typeface="Cambria Math" panose="02040503050406030204" pitchFamily="18" charset="0"/>
+                          </a:rPr>
+                        </m:ctrlPr>
+                      </m:sSubPr>
+                      <m:e>
+                        <m:r>
+                          <a:rPr lang="en-US" sz="2400" b="1" i="1" smtClean="0">
+                            <a:latin typeface="Cambria Math" panose="02040503050406030204" pitchFamily="18" charset="0"/>
+                          </a:rPr>
+                          <m:t>𝑼</m:t>
+                        </m:r>
+                      </m:e>
+                      <m:sub>
+                        <m:r>
+                          <a:rPr lang="en-US" sz="2400" b="1" i="1" smtClean="0">
+                            <a:latin typeface="Cambria Math" panose="02040503050406030204" pitchFamily="18" charset="0"/>
+                          </a:rPr>
+                          <m:t>∗</m:t>
+                        </m:r>
+                      </m:sub>
+                    </m:sSub>
+                  </m:oMath>
+                </a14:m>
+                <a:r>
+                  <a:rPr lang="en-US" sz="2400" b="1" dirty="0"/>
+                  <a:t>) in inefficient rivers</a:t>
+                </a:r>
+              </a:p>
+            </p:txBody>
+          </p:sp>
+        </mc:Choice>
+        <mc:Fallback>
+          <p:sp>
+            <p:nvSpPr>
+              <p:cNvPr id="4" name="TextBox 3">
+                <a:extLst>
+                  <a:ext uri="{FF2B5EF4-FFF2-40B4-BE49-F238E27FC236}">
+                    <a16:creationId xmlns:a16="http://schemas.microsoft.com/office/drawing/2014/main" id="{6555B11F-BF57-4408-AF7C-7631467B64DA}"/>
+                  </a:ext>
+                </a:extLst>
+              </p:cNvPr>
+              <p:cNvSpPr txBox="1">
+                <a:spLocks noRot="1" noChangeAspect="1" noMove="1" noResize="1" noEditPoints="1" noAdjustHandles="1" noChangeArrowheads="1" noChangeShapeType="1" noTextEdit="1"/>
+              </p:cNvSpPr>
+              <p:nvPr/>
+            </p:nvSpPr>
+            <p:spPr>
+              <a:xfrm>
+                <a:off x="541090" y="1547376"/>
+                <a:ext cx="11030649" cy="830997"/>
+              </a:xfrm>
+              <a:prstGeom prst="rect">
+                <a:avLst/>
+              </a:prstGeom>
+              <a:blipFill>
+                <a:blip r:embed="rId3"/>
+                <a:stretch>
+                  <a:fillRect l="-884" t="-5882" r="-1382" b="-16176"/>
+                </a:stretch>
+              </a:blipFill>
+            </p:spPr>
+            <p:txBody>
+              <a:bodyPr/>
+              <a:lstStyle/>
+              <a:p>
+                <a:r>
+                  <a:rPr lang="en-US">
+                    <a:noFill/>
+                  </a:rPr>
+                  <a:t> </a:t>
+                </a:r>
+              </a:p>
+            </p:txBody>
+          </p:sp>
+        </mc:Fallback>
+      </mc:AlternateContent>
+      <mc:AlternateContent xmlns:mc="http://schemas.openxmlformats.org/markup-compatibility/2006">
+        <mc:Choice xmlns:a14="http://schemas.microsoft.com/office/drawing/2010/main" Requires="a14">
+          <p:sp>
+            <p:nvSpPr>
+              <p:cNvPr id="9" name="TextBox 8">
+                <a:extLst>
+                  <a:ext uri="{FF2B5EF4-FFF2-40B4-BE49-F238E27FC236}">
+                    <a16:creationId xmlns:a16="http://schemas.microsoft.com/office/drawing/2014/main" id="{85DA0AD0-BD1D-4130-AD2E-065E3F050122}"/>
+                  </a:ext>
+                </a:extLst>
+              </p:cNvPr>
+              <p:cNvSpPr txBox="1"/>
+              <p:nvPr/>
+            </p:nvSpPr>
+            <p:spPr>
+              <a:xfrm>
+                <a:off x="0" y="2766161"/>
+                <a:ext cx="5310230" cy="3091680"/>
+              </a:xfrm>
+              <a:prstGeom prst="rect">
+                <a:avLst/>
+              </a:prstGeom>
+              <a:noFill/>
+            </p:spPr>
+            <p:txBody>
+              <a:bodyPr wrap="square" rtlCol="0">
+                <a:spAutoFit/>
+              </a:bodyPr>
+              <a:lstStyle/>
+              <a:p>
+                <a:r>
+                  <a:rPr lang="en-US" sz="2400" b="1" dirty="0"/>
+                  <a:t>Workflow</a:t>
+                </a:r>
+                <a:endParaRPr lang="en-US" dirty="0"/>
+              </a:p>
+              <a:p>
+                <a:pPr marL="342900" indent="-342900">
+                  <a:buAutoNum type="arabicParenR"/>
+                </a:pPr>
+                <a:r>
+                  <a:rPr lang="en-US" dirty="0"/>
+                  <a:t>Calculate Rh/H ratios and use them as thresholds for channel inefficiency</a:t>
+                </a:r>
+              </a:p>
+              <a:p>
+                <a:pPr marL="342900" indent="-342900">
+                  <a:buAutoNum type="arabicParenR"/>
+                </a:pPr>
+                <a:r>
+                  <a:rPr lang="en-US" dirty="0"/>
+                  <a:t>For each set of inefficient channels:</a:t>
+                </a:r>
+              </a:p>
+              <a:p>
+                <a:pPr marL="800100" lvl="1" indent="-342900">
+                  <a:buAutoNum type="arabicParenR"/>
+                </a:pPr>
+                <a:r>
+                  <a:rPr lang="en-US" dirty="0"/>
+                  <a:t>Fit two models: </a:t>
+                </a:r>
+                <a14:m>
+                  <m:oMath xmlns:m="http://schemas.openxmlformats.org/officeDocument/2006/math">
                     <m:sSub>
                       <m:sSubPr>
                         <m:ctrlPr>
@@ -5305,7 +5706,7 @@
                           <a:rPr lang="en-US" b="1" i="1" smtClean="0">
                             <a:latin typeface="Cambria Math" panose="02040503050406030204" pitchFamily="18" charset="0"/>
                           </a:rPr>
-                          <m:t>𝑼</m:t>
+                          <m:t>𝒌</m:t>
                         </m:r>
                       </m:e>
                       <m:sub>
@@ -5313,217 +5714,27 @@
                           <a:rPr lang="en-US" b="1" i="1" smtClean="0">
                             <a:latin typeface="Cambria Math" panose="02040503050406030204" pitchFamily="18" charset="0"/>
                           </a:rPr>
-                          <m:t>∗</m:t>
+                          <m:t>𝟔𝟎𝟎</m:t>
                         </m:r>
                       </m:sub>
                     </m:sSub>
-                  </m:oMath>
-                </a14:m>
-                <a:r>
-                  <a:rPr lang="en-US" b="1" dirty="0"/>
-                  <a:t>) in inefficient rivers</a:t>
-                </a:r>
-              </a:p>
-            </p:txBody>
-          </p:sp>
-        </mc:Choice>
-        <mc:Fallback>
-          <p:sp>
-            <p:nvSpPr>
-              <p:cNvPr id="11" name="TextBox 10">
-                <a:extLst>
-                  <a:ext uri="{FF2B5EF4-FFF2-40B4-BE49-F238E27FC236}">
-                    <a16:creationId xmlns:a16="http://schemas.microsoft.com/office/drawing/2014/main" id="{37731284-2C69-47F0-859C-CE4AD7B17468}"/>
-                  </a:ext>
-                </a:extLst>
-              </p:cNvPr>
-              <p:cNvSpPr txBox="1">
-                <a:spLocks noRot="1" noChangeAspect="1" noMove="1" noResize="1" noEditPoints="1" noAdjustHandles="1" noChangeArrowheads="1" noChangeShapeType="1" noTextEdit="1"/>
-              </p:cNvSpPr>
-              <p:nvPr/>
-            </p:nvSpPr>
-            <p:spPr>
-              <a:xfrm>
-                <a:off x="532700" y="6043875"/>
-                <a:ext cx="11030649" cy="646331"/>
-              </a:xfrm>
-              <a:prstGeom prst="rect">
-                <a:avLst/>
-              </a:prstGeom>
-              <a:blipFill>
-                <a:blip r:embed="rId5"/>
-                <a:stretch>
-                  <a:fillRect l="-442" t="-4717" b="-14151"/>
-                </a:stretch>
-              </a:blipFill>
-            </p:spPr>
-            <p:txBody>
-              <a:bodyPr/>
-              <a:lstStyle/>
-              <a:p>
-                <a:r>
-                  <a:rPr lang="en-US">
-                    <a:noFill/>
-                  </a:rPr>
-                  <a:t> </a:t>
-                </a:r>
-              </a:p>
-            </p:txBody>
-          </p:sp>
-        </mc:Fallback>
-      </mc:AlternateContent>
-      <p:sp>
-        <p:nvSpPr>
-          <p:cNvPr id="12" name="TextBox 11">
-            <a:extLst>
-              <a:ext uri="{FF2B5EF4-FFF2-40B4-BE49-F238E27FC236}">
-                <a16:creationId xmlns:a16="http://schemas.microsoft.com/office/drawing/2014/main" id="{47FA649B-093B-4191-BE7D-F4C351DC7E58}"/>
-              </a:ext>
-            </a:extLst>
-          </p:cNvPr>
-          <p:cNvSpPr txBox="1"/>
-          <p:nvPr/>
-        </p:nvSpPr>
-        <p:spPr>
-          <a:xfrm>
-            <a:off x="0" y="96762"/>
-            <a:ext cx="12192000" cy="584775"/>
-          </a:xfrm>
-          <a:prstGeom prst="rect">
-            <a:avLst/>
-          </a:prstGeom>
-          <a:noFill/>
-        </p:spPr>
-        <p:txBody>
-          <a:bodyPr wrap="square">
-            <a:spAutoFit/>
-          </a:bodyPr>
-          <a:lstStyle/>
-          <a:p>
-            <a:r>
-              <a:rPr lang="en-US" sz="3200" u="sng" dirty="0"/>
-              <a:t>River channel geometry influences form-drag production and dissipation</a:t>
-            </a:r>
-          </a:p>
-        </p:txBody>
-      </p:sp>
-    </p:spTree>
-    <p:extLst>
-      <p:ext uri="{BB962C8B-B14F-4D97-AF65-F5344CB8AC3E}">
-        <p14:creationId xmlns:p14="http://schemas.microsoft.com/office/powerpoint/2010/main" val="3578953865"/>
-      </p:ext>
-    </p:extLst>
-  </p:cSld>
-  <p:clrMapOvr>
-    <a:masterClrMapping/>
-  </p:clrMapOvr>
-</p:sld>
-</file>
-
-<file path=ppt/slides/slide3.xml><?xml version="1.0" encoding="utf-8"?>
-<p:sld xmlns:a="http://schemas.openxmlformats.org/drawingml/2006/main" xmlns:r="http://schemas.openxmlformats.org/officeDocument/2006/relationships" xmlns:p="http://schemas.openxmlformats.org/presentationml/2006/main">
-  <p:cSld>
-    <p:spTree>
-      <p:nvGrpSpPr>
-        <p:cNvPr id="1" name=""/>
-        <p:cNvGrpSpPr/>
-        <p:nvPr/>
-      </p:nvGrpSpPr>
-      <p:grpSpPr>
-        <a:xfrm>
-          <a:off x="0" y="0"/>
-          <a:ext cx="0" cy="0"/>
-          <a:chOff x="0" y="0"/>
-          <a:chExt cx="0" cy="0"/>
-        </a:xfrm>
-      </p:grpSpPr>
-      <mc:AlternateContent xmlns:mc="http://schemas.openxmlformats.org/markup-compatibility/2006">
-        <mc:Choice xmlns:a14="http://schemas.microsoft.com/office/drawing/2010/main" Requires="a14">
-          <p:sp>
-            <p:nvSpPr>
-              <p:cNvPr id="4" name="TextBox 3">
-                <a:extLst>
-                  <a:ext uri="{FF2B5EF4-FFF2-40B4-BE49-F238E27FC236}">
-                    <a16:creationId xmlns:a16="http://schemas.microsoft.com/office/drawing/2014/main" id="{1CC78B65-26B6-467E-BFF7-31D1EE980E1C}"/>
-                  </a:ext>
-                </a:extLst>
-              </p:cNvPr>
-              <p:cNvSpPr txBox="1"/>
-              <p:nvPr/>
-            </p:nvSpPr>
-            <p:spPr>
-              <a:xfrm>
-                <a:off x="315286" y="197578"/>
-                <a:ext cx="4304339" cy="3621569"/>
-              </a:xfrm>
-              <a:prstGeom prst="rect">
-                <a:avLst/>
-              </a:prstGeom>
-              <a:noFill/>
-            </p:spPr>
-            <p:txBody>
-              <a:bodyPr wrap="square" rtlCol="0">
-                <a:spAutoFit/>
-              </a:bodyPr>
-              <a:lstStyle/>
-              <a:p>
-                <a:r>
-                  <a:rPr lang="en-US" sz="2400" b="1" dirty="0"/>
-                  <a:t>Workflow</a:t>
-                </a:r>
-                <a:endParaRPr lang="en-US" b="1" dirty="0"/>
-              </a:p>
-              <a:p>
-                <a:pPr marL="342900" indent="-342900">
-                  <a:buAutoNum type="arabicParenR"/>
-                </a:pPr>
-                <a:r>
-                  <a:rPr lang="en-US" dirty="0"/>
-                  <a:t>Calculate Rh/H ratios and use them as thresholds for channel efficiency</a:t>
-                </a:r>
-              </a:p>
-              <a:p>
-                <a:pPr marL="342900" indent="-342900">
-                  <a:buAutoNum type="arabicParenR"/>
-                </a:pPr>
-                <a:r>
-                  <a:rPr lang="en-US" dirty="0"/>
-                  <a:t>For each set of inefficient channels:</a:t>
-                </a:r>
-              </a:p>
-              <a:p>
-                <a:pPr marL="800100" lvl="1" indent="-342900">
-                  <a:buAutoNum type="arabicParenR"/>
-                </a:pPr>
-                <a:r>
-                  <a:rPr lang="en-US" dirty="0"/>
-                  <a:t>Fit two models: </a:t>
-                </a:r>
-                <a14:m>
-                  <m:oMath xmlns:m="http://schemas.openxmlformats.org/officeDocument/2006/math">
                     <m:r>
-                      <a:rPr lang="en-US" b="0" i="1" smtClean="0">
-                        <a:latin typeface="Cambria Math" panose="02040503050406030204" pitchFamily="18" charset="0"/>
-                      </a:rPr>
-                      <m:t>𝑘</m:t>
-                    </m:r>
-                    <m:r>
-                      <a:rPr lang="en-US" b="0" i="1" smtClean="0">
+                      <a:rPr lang="en-US" b="1" i="1" smtClean="0">
                         <a:latin typeface="Cambria Math" panose="02040503050406030204" pitchFamily="18" charset="0"/>
                       </a:rPr>
                       <m:t>=</m:t>
                     </m:r>
                     <m:r>
-                      <a:rPr lang="en-US" b="0" i="1" smtClean="0">
+                      <a:rPr lang="en-US" b="1" i="1" smtClean="0">
                         <a:latin typeface="Cambria Math" panose="02040503050406030204" pitchFamily="18" charset="0"/>
                         <a:ea typeface="Cambria Math" panose="02040503050406030204" pitchFamily="18" charset="0"/>
                       </a:rPr>
-                      <m:t>𝛽</m:t>
+                      <m:t>𝜷</m:t>
                     </m:r>
                     <m:sSubSup>
                       <m:sSubSupPr>
                         <m:ctrlPr>
-                          <a:rPr lang="en-US" b="0" i="1" smtClean="0">
+                          <a:rPr lang="en-US" b="1" i="1" smtClean="0">
                             <a:latin typeface="Cambria Math" panose="02040503050406030204" pitchFamily="18" charset="0"/>
                             <a:ea typeface="Cambria Math" panose="02040503050406030204" pitchFamily="18" charset="0"/>
                           </a:rPr>
@@ -5531,27 +5742,27 @@
                       </m:sSubSupPr>
                       <m:e>
                         <m:r>
-                          <a:rPr lang="en-US" b="0" i="1" smtClean="0">
+                          <a:rPr lang="en-US" b="1" i="1" smtClean="0">
                             <a:latin typeface="Cambria Math" panose="02040503050406030204" pitchFamily="18" charset="0"/>
                             <a:ea typeface="Cambria Math" panose="02040503050406030204" pitchFamily="18" charset="0"/>
                           </a:rPr>
-                          <m:t>𝜀</m:t>
+                          <m:t>𝜺</m:t>
                         </m:r>
                       </m:e>
                       <m:sub>
                         <m:r>
-                          <a:rPr lang="en-US" b="0" i="1" smtClean="0">
+                          <a:rPr lang="en-US" b="1" i="1" smtClean="0">
                             <a:latin typeface="Cambria Math" panose="02040503050406030204" pitchFamily="18" charset="0"/>
                             <a:ea typeface="Cambria Math" panose="02040503050406030204" pitchFamily="18" charset="0"/>
                           </a:rPr>
-                          <m:t>𝐷</m:t>
+                          <m:t>𝑫</m:t>
                         </m:r>
                       </m:sub>
                       <m:sup>
                         <m:f>
                           <m:fPr>
                             <m:ctrlPr>
-                              <a:rPr lang="en-US" b="0" i="1" smtClean="0">
+                              <a:rPr lang="en-US" b="1" i="1" smtClean="0">
                                 <a:latin typeface="Cambria Math" panose="02040503050406030204" pitchFamily="18" charset="0"/>
                                 <a:ea typeface="Cambria Math" panose="02040503050406030204" pitchFamily="18" charset="0"/>
                               </a:rPr>
@@ -5559,20 +5770,20 @@
                           </m:fPr>
                           <m:num>
                             <m:r>
-                              <a:rPr lang="en-US" b="0" i="1" smtClean="0">
+                              <a:rPr lang="en-US" b="1" i="1" smtClean="0">
                                 <a:latin typeface="Cambria Math" panose="02040503050406030204" pitchFamily="18" charset="0"/>
                                 <a:ea typeface="Cambria Math" panose="02040503050406030204" pitchFamily="18" charset="0"/>
                               </a:rPr>
-                              <m:t>1</m:t>
+                              <m:t>𝟏</m:t>
                             </m:r>
                           </m:num>
                           <m:den>
                             <m:r>
-                              <a:rPr lang="en-US" b="0" i="1" smtClean="0">
+                              <a:rPr lang="en-US" b="1" i="1" smtClean="0">
                                 <a:latin typeface="Cambria Math" panose="02040503050406030204" pitchFamily="18" charset="0"/>
                                 <a:ea typeface="Cambria Math" panose="02040503050406030204" pitchFamily="18" charset="0"/>
                               </a:rPr>
-                              <m:t>4</m:t>
+                              <m:t>𝟒</m:t>
                             </m:r>
                           </m:den>
                         </m:f>
@@ -5586,28 +5797,47 @@
                 </a:r>
                 <a14:m>
                   <m:oMath xmlns:m="http://schemas.openxmlformats.org/officeDocument/2006/math">
+                    <m:sSub>
+                      <m:sSubPr>
+                        <m:ctrlPr>
+                          <a:rPr lang="en-US" b="1" i="1" smtClean="0">
+                            <a:latin typeface="Cambria Math" panose="02040503050406030204" pitchFamily="18" charset="0"/>
+                          </a:rPr>
+                        </m:ctrlPr>
+                      </m:sSubPr>
+                      <m:e>
+                        <m:r>
+                          <a:rPr lang="en-US" b="1" i="1" smtClean="0">
+                            <a:latin typeface="Cambria Math" panose="02040503050406030204" pitchFamily="18" charset="0"/>
+                          </a:rPr>
+                          <m:t>𝒌</m:t>
+                        </m:r>
+                      </m:e>
+                      <m:sub>
+                        <m:r>
+                          <a:rPr lang="en-US" b="1" i="1" smtClean="0">
+                            <a:latin typeface="Cambria Math" panose="02040503050406030204" pitchFamily="18" charset="0"/>
+                          </a:rPr>
+                          <m:t>𝟔𝟎𝟎</m:t>
+                        </m:r>
+                      </m:sub>
+                    </m:sSub>
                     <m:r>
-                      <a:rPr lang="en-US" b="0" i="1" smtClean="0">
-                        <a:latin typeface="Cambria Math" panose="02040503050406030204" pitchFamily="18" charset="0"/>
-                      </a:rPr>
-                      <m:t>𝑘</m:t>
-                    </m:r>
-                    <m:r>
-                      <a:rPr lang="en-US" b="0" i="1" smtClean="0">
+                      <a:rPr lang="en-US" b="1" i="1" smtClean="0">
                         <a:latin typeface="Cambria Math" panose="02040503050406030204" pitchFamily="18" charset="0"/>
                       </a:rPr>
                       <m:t>=</m:t>
                     </m:r>
                     <m:r>
-                      <a:rPr lang="en-US" b="0" i="1" smtClean="0">
+                      <a:rPr lang="en-US" b="1" i="1" smtClean="0">
                         <a:latin typeface="Cambria Math" panose="02040503050406030204" pitchFamily="18" charset="0"/>
                       </a:rPr>
-                      <m:t>𝑎</m:t>
+                      <m:t>𝒂</m:t>
                     </m:r>
                     <m:sSubSup>
                       <m:sSubSupPr>
                         <m:ctrlPr>
-                          <a:rPr lang="en-US" b="0" i="1" smtClean="0">
+                          <a:rPr lang="en-US" b="1" i="1" smtClean="0">
                             <a:latin typeface="Cambria Math" panose="02040503050406030204" pitchFamily="18" charset="0"/>
                             <a:ea typeface="Cambria Math" panose="02040503050406030204" pitchFamily="18" charset="0"/>
                           </a:rPr>
@@ -5615,29 +5845,29 @@
                       </m:sSubSupPr>
                       <m:e>
                         <m:r>
-                          <a:rPr lang="en-US" b="0" i="1" smtClean="0">
+                          <a:rPr lang="en-US" b="1" i="1" smtClean="0">
                             <a:latin typeface="Cambria Math" panose="02040503050406030204" pitchFamily="18" charset="0"/>
                             <a:ea typeface="Cambria Math" panose="02040503050406030204" pitchFamily="18" charset="0"/>
                           </a:rPr>
-                          <m:t>𝜀</m:t>
+                          <m:t>𝜺</m:t>
                         </m:r>
                       </m:e>
                       <m:sub>
                         <m:r>
-                          <a:rPr lang="en-US" b="0" i="1" smtClean="0">
+                          <a:rPr lang="en-US" b="1" i="1" smtClean="0">
                             <a:latin typeface="Cambria Math" panose="02040503050406030204" pitchFamily="18" charset="0"/>
                             <a:ea typeface="Cambria Math" panose="02040503050406030204" pitchFamily="18" charset="0"/>
                           </a:rPr>
-                          <m:t>𝐷</m:t>
+                          <m:t>𝑫</m:t>
                         </m:r>
                       </m:sub>
                       <m:sup>
                         <m:r>
-                          <a:rPr lang="en-US" b="0" i="1" smtClean="0">
+                          <a:rPr lang="en-US" b="1" i="1" smtClean="0">
                             <a:latin typeface="Cambria Math" panose="02040503050406030204" pitchFamily="18" charset="0"/>
                             <a:ea typeface="Cambria Math" panose="02040503050406030204" pitchFamily="18" charset="0"/>
                           </a:rPr>
-                          <m:t>𝑏</m:t>
+                          <m:t>𝒃</m:t>
                         </m:r>
                       </m:sup>
                     </m:sSubSup>
@@ -5726,7 +5956,7 @@
                       <a:srgbClr val="006600"/>
                     </a:solidFill>
                   </a:rPr>
-                  <a:t> score for </a:t>
+                  <a:t> for </a:t>
                 </a:r>
                 <a14:m>
                   <m:oMath xmlns:m="http://schemas.openxmlformats.org/officeDocument/2006/math">
@@ -5851,7 +6081,7 @@
                 </a:pPr>
                 <a:r>
                   <a:rPr lang="en-US" dirty="0"/>
-                  <a:t>At what (if at all) efficiency threshold does </a:t>
+                  <a:t>At what (if at all) inefficiency threshold does </a:t>
                 </a:r>
                 <a:r>
                   <a:rPr lang="en-US" i="1" dirty="0"/>
@@ -5876,10 +6106,10 @@
         <mc:Fallback>
           <p:sp>
             <p:nvSpPr>
-              <p:cNvPr id="4" name="TextBox 3">
+              <p:cNvPr id="9" name="TextBox 8">
                 <a:extLst>
                   <a:ext uri="{FF2B5EF4-FFF2-40B4-BE49-F238E27FC236}">
-                    <a16:creationId xmlns:a16="http://schemas.microsoft.com/office/drawing/2014/main" id="{1CC78B65-26B6-467E-BFF7-31D1EE980E1C}"/>
+                    <a16:creationId xmlns:a16="http://schemas.microsoft.com/office/drawing/2014/main" id="{85DA0AD0-BD1D-4130-AD2E-065E3F050122}"/>
                   </a:ext>
                 </a:extLst>
               </p:cNvPr>
@@ -5890,16 +6120,16 @@
             </p:nvSpPr>
             <p:spPr>
               <a:xfrm>
-                <a:off x="315286" y="197578"/>
-                <a:ext cx="4304339" cy="3621569"/>
+                <a:off x="0" y="2766161"/>
+                <a:ext cx="5310230" cy="3091680"/>
               </a:xfrm>
               <a:prstGeom prst="rect">
                 <a:avLst/>
               </a:prstGeom>
               <a:blipFill>
-                <a:blip r:embed="rId2"/>
+                <a:blip r:embed="rId4"/>
                 <a:stretch>
-                  <a:fillRect l="-2266" t="-1345" b="-1513"/>
+                  <a:fillRect l="-1722" t="-1578" b="-1578"/>
                 </a:stretch>
               </a:blipFill>
             </p:spPr>
@@ -5920,10 +6150,10 @@
       </mc:AlternateContent>
       <p:pic>
         <p:nvPicPr>
-          <p:cNvPr id="13" name="Picture 12" descr="Diagram&#10;&#10;Description automatically generated">
+          <p:cNvPr id="10" name="Picture 9" descr="Diagram&#10;&#10;Description automatically generated">
             <a:extLst>
               <a:ext uri="{FF2B5EF4-FFF2-40B4-BE49-F238E27FC236}">
-                <a16:creationId xmlns:a16="http://schemas.microsoft.com/office/drawing/2014/main" id="{CD5A47BA-B65D-41C7-8481-FB8763DE5947}"/>
+                <a16:creationId xmlns:a16="http://schemas.microsoft.com/office/drawing/2014/main" id="{A21BA237-46F8-48DD-8015-508BAC7FCFEF}"/>
               </a:ext>
             </a:extLst>
           </p:cNvPr>
@@ -5932,28 +6162,127 @@
           </p:cNvPicPr>
           <p:nvPr/>
         </p:nvPicPr>
-        <p:blipFill>
-          <a:blip r:embed="rId3">
+        <p:blipFill rotWithShape="1">
+          <a:blip r:embed="rId5">
             <a:extLst>
               <a:ext uri="{28A0092B-C50C-407E-A947-70E740481C1C}">
                 <a14:useLocalDpi xmlns:a14="http://schemas.microsoft.com/office/drawing/2010/main" val="0"/>
               </a:ext>
             </a:extLst>
           </a:blip>
-          <a:stretch>
-            <a:fillRect/>
-          </a:stretch>
+          <a:srcRect l="4180" t="50765" b="27461"/>
+          <a:stretch/>
         </p:blipFill>
         <p:spPr>
           <a:xfrm>
-            <a:off x="5334000" y="0"/>
-            <a:ext cx="6858000" cy="6858000"/>
+            <a:off x="5226341" y="2625754"/>
+            <a:ext cx="6571376" cy="1493242"/>
           </a:xfrm>
           <a:prstGeom prst="rect">
             <a:avLst/>
           </a:prstGeom>
         </p:spPr>
       </p:pic>
+      <p:sp>
+        <p:nvSpPr>
+          <p:cNvPr id="11" name="TextBox 10">
+            <a:extLst>
+              <a:ext uri="{FF2B5EF4-FFF2-40B4-BE49-F238E27FC236}">
+                <a16:creationId xmlns:a16="http://schemas.microsoft.com/office/drawing/2014/main" id="{1959BFEB-D27C-4B58-9E10-821D99C105B4}"/>
+              </a:ext>
+            </a:extLst>
+          </p:cNvPr>
+          <p:cNvSpPr txBox="1"/>
+          <p:nvPr/>
+        </p:nvSpPr>
+        <p:spPr>
+          <a:xfrm>
+            <a:off x="5469623" y="2491530"/>
+            <a:ext cx="1249959" cy="369332"/>
+          </a:xfrm>
+          <a:prstGeom prst="rect">
+            <a:avLst/>
+          </a:prstGeom>
+          <a:noFill/>
+        </p:spPr>
+        <p:txBody>
+          <a:bodyPr wrap="square" rtlCol="0">
+            <a:spAutoFit/>
+          </a:bodyPr>
+          <a:lstStyle/>
+          <a:p>
+            <a:r>
+              <a:rPr lang="en-US" dirty="0"/>
+              <a:t>Rh/H is low</a:t>
+            </a:r>
+          </a:p>
+        </p:txBody>
+      </p:sp>
+      <p:sp>
+        <p:nvSpPr>
+          <p:cNvPr id="12" name="TextBox 11">
+            <a:extLst>
+              <a:ext uri="{FF2B5EF4-FFF2-40B4-BE49-F238E27FC236}">
+                <a16:creationId xmlns:a16="http://schemas.microsoft.com/office/drawing/2014/main" id="{C40FD47F-0346-4C14-8DA0-5FE18D97EE83}"/>
+              </a:ext>
+            </a:extLst>
+          </p:cNvPr>
+          <p:cNvSpPr txBox="1"/>
+          <p:nvPr/>
+        </p:nvSpPr>
+        <p:spPr>
+          <a:xfrm>
+            <a:off x="9959131" y="2509705"/>
+            <a:ext cx="1609287" cy="369332"/>
+          </a:xfrm>
+          <a:prstGeom prst="rect">
+            <a:avLst/>
+          </a:prstGeom>
+          <a:noFill/>
+        </p:spPr>
+        <p:txBody>
+          <a:bodyPr wrap="square" rtlCol="0">
+            <a:spAutoFit/>
+          </a:bodyPr>
+          <a:lstStyle/>
+          <a:p>
+            <a:r>
+              <a:rPr lang="en-US" dirty="0"/>
+              <a:t>Rh/H is near 1</a:t>
+            </a:r>
+          </a:p>
+        </p:txBody>
+      </p:sp>
+    </p:spTree>
+    <p:extLst>
+      <p:ext uri="{BB962C8B-B14F-4D97-AF65-F5344CB8AC3E}">
+        <p14:creationId xmlns:p14="http://schemas.microsoft.com/office/powerpoint/2010/main" val="3557711385"/>
+      </p:ext>
+    </p:extLst>
+  </p:cSld>
+  <p:clrMapOvr>
+    <a:masterClrMapping/>
+  </p:clrMapOvr>
+</p:sld>
+</file>
+
+<file path=ppt/slides/slide4.xml><?xml version="1.0" encoding="utf-8"?>
+<p:sld xmlns:a="http://schemas.openxmlformats.org/drawingml/2006/main" xmlns:r="http://schemas.openxmlformats.org/officeDocument/2006/relationships" xmlns:p="http://schemas.openxmlformats.org/presentationml/2006/main">
+  <p:cSld>
+    <p:spTree>
+      <p:nvGrpSpPr>
+        <p:cNvPr id="1" name=""/>
+        <p:cNvGrpSpPr/>
+        <p:nvPr/>
+      </p:nvGrpSpPr>
+      <p:grpSpPr>
+        <a:xfrm>
+          <a:off x="0" y="0"/>
+          <a:ext cx="0" cy="0"/>
+          <a:chOff x="0" y="0"/>
+          <a:chExt cx="0" cy="0"/>
+        </a:xfrm>
+      </p:grpSpPr>
       <mc:AlternateContent xmlns:mc="http://schemas.openxmlformats.org/markup-compatibility/2006">
         <mc:Choice xmlns:a14="http://schemas.microsoft.com/office/drawing/2010/main" Requires="a14">
           <p:sp>
@@ -5970,8 +6299,8 @@
             </p:nvSpPr>
             <p:spPr>
               <a:xfrm>
-                <a:off x="315286" y="4161012"/>
-                <a:ext cx="4304339" cy="2123658"/>
+                <a:off x="374009" y="1510090"/>
+                <a:ext cx="4634219" cy="3539430"/>
               </a:xfrm>
               <a:prstGeom prst="rect">
                 <a:avLst/>
@@ -5985,21 +6314,21 @@
               <a:lstStyle/>
               <a:p>
                 <a:r>
-                  <a:rPr lang="en-US" sz="2400" b="1" dirty="0"/>
+                  <a:rPr lang="en-US" sz="3200" b="1" dirty="0"/>
                   <a:t>Results</a:t>
                 </a:r>
-                <a:endParaRPr lang="en-US" b="1" dirty="0"/>
+                <a:endParaRPr lang="en-US" sz="2400" b="1" dirty="0"/>
               </a:p>
               <a:p>
                 <a:pPr marL="342900" indent="-342900">
                   <a:buAutoNum type="arabicParenR"/>
                 </a:pPr>
                 <a:r>
-                  <a:rPr lang="en-US" dirty="0"/>
+                  <a:rPr lang="en-US" sz="2400" dirty="0"/>
                   <a:t>Theoretical model is recovered when channel inefficiency is greatest (</a:t>
                 </a:r>
                 <a:r>
-                  <a:rPr lang="en-US" dirty="0">
+                  <a:rPr lang="en-US" sz="2400" dirty="0">
                     <a:solidFill>
                       <a:srgbClr val="00008B"/>
                     </a:solidFill>
@@ -6007,11 +6336,11 @@
                   <a:t>b=0.28</a:t>
                 </a:r>
                 <a:r>
-                  <a:rPr lang="en-US" dirty="0"/>
+                  <a:rPr lang="en-US" sz="2400" dirty="0"/>
                   <a:t>, </a:t>
                 </a:r>
                 <a:r>
-                  <a:rPr lang="en-US" dirty="0">
+                  <a:rPr lang="en-US" sz="2400" dirty="0">
                     <a:solidFill>
                       <a:srgbClr val="006600"/>
                     </a:solidFill>
@@ -6019,7 +6348,7 @@
                   <a:t>r</a:t>
                 </a:r>
                 <a:r>
-                  <a:rPr lang="en-US" baseline="30000" dirty="0">
+                  <a:rPr lang="en-US" sz="2400" baseline="30000" dirty="0">
                     <a:solidFill>
                       <a:srgbClr val="006600"/>
                     </a:solidFill>
@@ -6027,7 +6356,7 @@
                   <a:t>2</a:t>
                 </a:r>
                 <a:r>
-                  <a:rPr lang="en-US" dirty="0">
+                  <a:rPr lang="en-US" sz="2400" dirty="0">
                     <a:solidFill>
                       <a:srgbClr val="006600"/>
                     </a:solidFill>
@@ -6035,11 +6364,11 @@
                   <a:t>: 0.68</a:t>
                 </a:r>
                 <a:r>
-                  <a:rPr lang="en-US" dirty="0"/>
+                  <a:rPr lang="en-US" sz="2400" dirty="0"/>
                   <a:t>) </a:t>
                 </a:r>
                 <a:r>
-                  <a:rPr lang="en-US" i="1" dirty="0"/>
+                  <a:rPr lang="en-US" sz="2400" i="1" dirty="0"/>
                   <a:t>panels a, c, d</a:t>
                 </a:r>
               </a:p>
@@ -6048,11 +6377,277 @@
                   <a:buAutoNum type="arabicParenR"/>
                 </a:pPr>
                 <a:r>
-                  <a:rPr lang="en-US" dirty="0"/>
+                  <a:rPr lang="en-US" sz="2400" dirty="0"/>
                   <a:t>We can produce an ~identical but more parsimonious model by scaling k directly with depth-scale turbulence (</a:t>
                 </a:r>
                 <a14:m>
                   <m:oMath xmlns:m="http://schemas.openxmlformats.org/officeDocument/2006/math">
+                    <m:sSub>
+                      <m:sSubPr>
+                        <m:ctrlPr>
+                          <a:rPr lang="en-US" sz="2400" b="0" i="1" smtClean="0">
+                            <a:latin typeface="Cambria Math" panose="02040503050406030204" pitchFamily="18" charset="0"/>
+                          </a:rPr>
+                        </m:ctrlPr>
+                      </m:sSubPr>
+                      <m:e>
+                        <m:r>
+                          <a:rPr lang="en-US" sz="2400" b="0" i="1" smtClean="0">
+                            <a:latin typeface="Cambria Math" panose="02040503050406030204" pitchFamily="18" charset="0"/>
+                          </a:rPr>
+                          <m:t>𝑈</m:t>
+                        </m:r>
+                      </m:e>
+                      <m:sub>
+                        <m:r>
+                          <a:rPr lang="en-US" sz="2400" b="0" i="1" smtClean="0">
+                            <a:latin typeface="Cambria Math" panose="02040503050406030204" pitchFamily="18" charset="0"/>
+                          </a:rPr>
+                          <m:t>∗</m:t>
+                        </m:r>
+                      </m:sub>
+                    </m:sSub>
+                  </m:oMath>
+                </a14:m>
+                <a:r>
+                  <a:rPr lang="en-US" sz="2400" dirty="0"/>
+                  <a:t>) </a:t>
+                </a:r>
+                <a:r>
+                  <a:rPr lang="en-US" sz="2400" i="1" dirty="0"/>
+                  <a:t>panel b</a:t>
+                </a:r>
+                <a:endParaRPr lang="en-US" sz="2400" dirty="0"/>
+              </a:p>
+            </p:txBody>
+          </p:sp>
+        </mc:Choice>
+        <mc:Fallback>
+          <p:sp>
+            <p:nvSpPr>
+              <p:cNvPr id="20" name="TextBox 19">
+                <a:extLst>
+                  <a:ext uri="{FF2B5EF4-FFF2-40B4-BE49-F238E27FC236}">
+                    <a16:creationId xmlns:a16="http://schemas.microsoft.com/office/drawing/2014/main" id="{BA022A3F-671A-4EFA-B36F-3126EAAE6875}"/>
+                  </a:ext>
+                </a:extLst>
+              </p:cNvPr>
+              <p:cNvSpPr txBox="1">
+                <a:spLocks noRot="1" noChangeAspect="1" noMove="1" noResize="1" noEditPoints="1" noAdjustHandles="1" noChangeArrowheads="1" noChangeShapeType="1" noTextEdit="1"/>
+              </p:cNvSpPr>
+              <p:nvPr/>
+            </p:nvSpPr>
+            <p:spPr>
+              <a:xfrm>
+                <a:off x="374009" y="1510090"/>
+                <a:ext cx="4634219" cy="3539430"/>
+              </a:xfrm>
+              <a:prstGeom prst="rect">
+                <a:avLst/>
+              </a:prstGeom>
+              <a:blipFill>
+                <a:blip r:embed="rId2"/>
+                <a:stretch>
+                  <a:fillRect l="-3285" t="-2241" r="-3417" b="-3103"/>
+                </a:stretch>
+              </a:blipFill>
+            </p:spPr>
+            <p:txBody>
+              <a:bodyPr/>
+              <a:lstStyle/>
+              <a:p>
+                <a:r>
+                  <a:rPr lang="en-US">
+                    <a:noFill/>
+                  </a:rPr>
+                  <a:t> </a:t>
+                </a:r>
+              </a:p>
+            </p:txBody>
+          </p:sp>
+        </mc:Fallback>
+      </mc:AlternateContent>
+      <p:pic>
+        <p:nvPicPr>
+          <p:cNvPr id="3" name="Picture 2" descr="Diagram&#10;&#10;Description automatically generated">
+            <a:extLst>
+              <a:ext uri="{FF2B5EF4-FFF2-40B4-BE49-F238E27FC236}">
+                <a16:creationId xmlns:a16="http://schemas.microsoft.com/office/drawing/2014/main" id="{CD37A3AE-71DF-46B7-A4D4-3CBE5D6590D3}"/>
+              </a:ext>
+            </a:extLst>
+          </p:cNvPr>
+          <p:cNvPicPr>
+            <a:picLocks noChangeAspect="1"/>
+          </p:cNvPicPr>
+          <p:nvPr/>
+        </p:nvPicPr>
+        <p:blipFill>
+          <a:blip r:embed="rId3">
+            <a:extLst>
+              <a:ext uri="{28A0092B-C50C-407E-A947-70E740481C1C}">
+                <a14:useLocalDpi xmlns:a14="http://schemas.microsoft.com/office/drawing/2010/main" val="0"/>
+              </a:ext>
+            </a:extLst>
+          </a:blip>
+          <a:stretch>
+            <a:fillRect/>
+          </a:stretch>
+        </p:blipFill>
+        <p:spPr>
+          <a:xfrm>
+            <a:off x="5764184" y="0"/>
+            <a:ext cx="6368143" cy="6858000"/>
+          </a:xfrm>
+          <a:prstGeom prst="rect">
+            <a:avLst/>
+          </a:prstGeom>
+        </p:spPr>
+      </p:pic>
+      <p:cxnSp>
+        <p:nvCxnSpPr>
+          <p:cNvPr id="6" name="Straight Connector 5">
+            <a:extLst>
+              <a:ext uri="{FF2B5EF4-FFF2-40B4-BE49-F238E27FC236}">
+                <a16:creationId xmlns:a16="http://schemas.microsoft.com/office/drawing/2014/main" id="{55EF8931-F184-4914-8C0C-50F558DC1642}"/>
+              </a:ext>
+            </a:extLst>
+          </p:cNvPr>
+          <p:cNvCxnSpPr/>
+          <p:nvPr/>
+        </p:nvCxnSpPr>
+        <p:spPr>
+          <a:xfrm>
+            <a:off x="5830349" y="4957894"/>
+            <a:ext cx="6361651" cy="0"/>
+          </a:xfrm>
+          <a:prstGeom prst="line">
+            <a:avLst/>
+          </a:prstGeom>
+          <a:ln w="38100">
+            <a:prstDash val="dash"/>
+          </a:ln>
+        </p:spPr>
+        <p:style>
+          <a:lnRef idx="1">
+            <a:schemeClr val="dk1"/>
+          </a:lnRef>
+          <a:fillRef idx="0">
+            <a:schemeClr val="dk1"/>
+          </a:fillRef>
+          <a:effectRef idx="0">
+            <a:schemeClr val="dk1"/>
+          </a:effectRef>
+          <a:fontRef idx="minor">
+            <a:schemeClr val="tx1"/>
+          </a:fontRef>
+        </p:style>
+      </p:cxnSp>
+    </p:spTree>
+    <p:extLst>
+      <p:ext uri="{BB962C8B-B14F-4D97-AF65-F5344CB8AC3E}">
+        <p14:creationId xmlns:p14="http://schemas.microsoft.com/office/powerpoint/2010/main" val="3779462781"/>
+      </p:ext>
+    </p:extLst>
+  </p:cSld>
+  <p:clrMapOvr>
+    <a:masterClrMapping/>
+  </p:clrMapOvr>
+</p:sld>
+</file>
+
+<file path=ppt/slides/slide5.xml><?xml version="1.0" encoding="utf-8"?>
+<p:sld xmlns:a="http://schemas.openxmlformats.org/drawingml/2006/main" xmlns:r="http://schemas.openxmlformats.org/officeDocument/2006/relationships" xmlns:p="http://schemas.openxmlformats.org/presentationml/2006/main">
+  <p:cSld>
+    <p:spTree>
+      <p:nvGrpSpPr>
+        <p:cNvPr id="1" name=""/>
+        <p:cNvGrpSpPr/>
+        <p:nvPr/>
+      </p:nvGrpSpPr>
+      <p:grpSpPr>
+        <a:xfrm>
+          <a:off x="0" y="0"/>
+          <a:ext cx="0" cy="0"/>
+          <a:chOff x="0" y="0"/>
+          <a:chExt cx="0" cy="0"/>
+        </a:xfrm>
+      </p:grpSpPr>
+      <p:sp>
+        <p:nvSpPr>
+          <p:cNvPr id="2" name="Title 1">
+            <a:extLst>
+              <a:ext uri="{FF2B5EF4-FFF2-40B4-BE49-F238E27FC236}">
+                <a16:creationId xmlns:a16="http://schemas.microsoft.com/office/drawing/2014/main" id="{BAEF32F9-9F19-4C90-956B-CE6FF0FD8366}"/>
+              </a:ext>
+            </a:extLst>
+          </p:cNvPr>
+          <p:cNvSpPr>
+            <a:spLocks noGrp="1"/>
+          </p:cNvSpPr>
+          <p:nvPr>
+            <p:ph type="title"/>
+          </p:nvPr>
+        </p:nvSpPr>
+        <p:spPr/>
+        <p:txBody>
+          <a:bodyPr/>
+          <a:lstStyle/>
+          <a:p>
+            <a:r>
+              <a:rPr lang="en-US" dirty="0"/>
+              <a:t>What does this mean for SWOT?</a:t>
+            </a:r>
+          </a:p>
+        </p:txBody>
+      </p:sp>
+      <mc:AlternateContent xmlns:mc="http://schemas.openxmlformats.org/markup-compatibility/2006">
+        <mc:Choice xmlns:a14="http://schemas.microsoft.com/office/drawing/2010/main" Requires="a14">
+          <p:sp>
+            <p:nvSpPr>
+              <p:cNvPr id="3" name="Content Placeholder 2">
+                <a:extLst>
+                  <a:ext uri="{FF2B5EF4-FFF2-40B4-BE49-F238E27FC236}">
+                    <a16:creationId xmlns:a16="http://schemas.microsoft.com/office/drawing/2014/main" id="{31C5C002-A510-4E15-B2FA-5FC09EA9A031}"/>
+                  </a:ext>
+                </a:extLst>
+              </p:cNvPr>
+              <p:cNvSpPr>
+                <a:spLocks noGrp="1"/>
+              </p:cNvSpPr>
+              <p:nvPr>
+                <p:ph idx="1"/>
+              </p:nvPr>
+            </p:nvSpPr>
+            <p:spPr/>
+            <p:txBody>
+              <a:bodyPr/>
+              <a:lstStyle/>
+              <a:p>
+                <a:r>
+                  <a:rPr lang="en-US" dirty="0"/>
+                  <a:t>Using Brinkerhoff et al (2019) dataset (n=171,553), I found that 95% of SWOT-observable river measurements had Rh within 5% of H</a:t>
+                </a:r>
+              </a:p>
+              <a:p>
+                <a:pPr lvl="1"/>
+                <a:r>
+                  <a:rPr lang="en-US" dirty="0"/>
+                  <a:t>This theoretical model for k (</a:t>
+                </a:r>
+                <a14:m>
+                  <m:oMath xmlns:m="http://schemas.openxmlformats.org/officeDocument/2006/math">
+                    <m:r>
+                      <a:rPr lang="en-US" b="0" i="1" smtClean="0">
+                        <a:latin typeface="Cambria Math" panose="02040503050406030204" pitchFamily="18" charset="0"/>
+                      </a:rPr>
+                      <m:t>𝑘</m:t>
+                    </m:r>
+                    <m:r>
+                      <a:rPr lang="en-US" b="0" i="1" smtClean="0">
+                        <a:latin typeface="Cambria Math" panose="02040503050406030204" pitchFamily="18" charset="0"/>
+                      </a:rPr>
+                      <m:t>~</m:t>
+                    </m:r>
                     <m:sSub>
                       <m:sSubPr>
                         <m:ctrlPr>
@@ -6078,17 +6673,76 @@
                         </m:r>
                       </m:sub>
                     </m:sSub>
+                    <m:r>
+                      <a:rPr lang="en-US" b="0" i="1" smtClean="0">
+                        <a:latin typeface="Cambria Math" panose="02040503050406030204" pitchFamily="18" charset="0"/>
+                      </a:rPr>
+                      <m:t>~</m:t>
+                    </m:r>
+                    <m:sSubSup>
+                      <m:sSubSupPr>
+                        <m:ctrlPr>
+                          <a:rPr lang="en-US" b="0" i="1" smtClean="0">
+                            <a:latin typeface="Cambria Math" panose="02040503050406030204" pitchFamily="18" charset="0"/>
+                            <a:ea typeface="Cambria Math" panose="02040503050406030204" pitchFamily="18" charset="0"/>
+                          </a:rPr>
+                        </m:ctrlPr>
+                      </m:sSubSupPr>
+                      <m:e>
+                        <m:r>
+                          <a:rPr lang="en-US" b="0" i="1" smtClean="0">
+                            <a:latin typeface="Cambria Math" panose="02040503050406030204" pitchFamily="18" charset="0"/>
+                            <a:ea typeface="Cambria Math" panose="02040503050406030204" pitchFamily="18" charset="0"/>
+                          </a:rPr>
+                          <m:t>𝜀</m:t>
+                        </m:r>
+                      </m:e>
+                      <m:sub>
+                        <m:r>
+                          <a:rPr lang="en-US" b="0" i="1" smtClean="0">
+                            <a:latin typeface="Cambria Math" panose="02040503050406030204" pitchFamily="18" charset="0"/>
+                            <a:ea typeface="Cambria Math" panose="02040503050406030204" pitchFamily="18" charset="0"/>
+                          </a:rPr>
+                          <m:t>𝐷</m:t>
+                        </m:r>
+                      </m:sub>
+                      <m:sup>
+                        <m:f>
+                          <m:fPr>
+                            <m:ctrlPr>
+                              <a:rPr lang="en-US" b="0" i="1" smtClean="0">
+                                <a:latin typeface="Cambria Math" panose="02040503050406030204" pitchFamily="18" charset="0"/>
+                                <a:ea typeface="Cambria Math" panose="02040503050406030204" pitchFamily="18" charset="0"/>
+                              </a:rPr>
+                            </m:ctrlPr>
+                          </m:fPr>
+                          <m:num>
+                            <m:r>
+                              <a:rPr lang="en-US" b="0" i="1" smtClean="0">
+                                <a:latin typeface="Cambria Math" panose="02040503050406030204" pitchFamily="18" charset="0"/>
+                                <a:ea typeface="Cambria Math" panose="02040503050406030204" pitchFamily="18" charset="0"/>
+                              </a:rPr>
+                              <m:t>1</m:t>
+                            </m:r>
+                          </m:num>
+                          <m:den>
+                            <m:r>
+                              <a:rPr lang="en-US" b="0" i="1" smtClean="0">
+                                <a:latin typeface="Cambria Math" panose="02040503050406030204" pitchFamily="18" charset="0"/>
+                                <a:ea typeface="Cambria Math" panose="02040503050406030204" pitchFamily="18" charset="0"/>
+                              </a:rPr>
+                              <m:t>4</m:t>
+                            </m:r>
+                          </m:den>
+                        </m:f>
+                      </m:sup>
+                    </m:sSubSup>
                   </m:oMath>
                 </a14:m>
                 <a:r>
                   <a:rPr lang="en-US" dirty="0"/>
-                  <a:t>) </a:t>
-                </a:r>
-                <a:r>
-                  <a:rPr lang="en-US" i="1" dirty="0"/>
-                  <a:t>panel b</a:t>
-                </a:r>
-                <a:endParaRPr lang="en-US" dirty="0"/>
+                  <a:t>) is therefore generally valid in SWOT-observable rivers and we can exploit this physical model to build a parsimonious BIKER algorithm with minimal unknowns</a:t>
+                </a:r>
               </a:p>
             </p:txBody>
           </p:sp>
@@ -6096,30 +6750,25 @@
         <mc:Fallback>
           <p:sp>
             <p:nvSpPr>
-              <p:cNvPr id="20" name="TextBox 19">
+              <p:cNvPr id="3" name="Content Placeholder 2">
                 <a:extLst>
                   <a:ext uri="{FF2B5EF4-FFF2-40B4-BE49-F238E27FC236}">
-                    <a16:creationId xmlns:a16="http://schemas.microsoft.com/office/drawing/2014/main" id="{BA022A3F-671A-4EFA-B36F-3126EAAE6875}"/>
+                    <a16:creationId xmlns:a16="http://schemas.microsoft.com/office/drawing/2014/main" id="{31C5C002-A510-4E15-B2FA-5FC09EA9A031}"/>
                   </a:ext>
                 </a:extLst>
               </p:cNvPr>
-              <p:cNvSpPr txBox="1">
-                <a:spLocks noRot="1" noChangeAspect="1" noMove="1" noResize="1" noEditPoints="1" noAdjustHandles="1" noChangeArrowheads="1" noChangeShapeType="1" noTextEdit="1"/>
+              <p:cNvSpPr>
+                <a:spLocks noGrp="1" noRot="1" noChangeAspect="1" noMove="1" noResize="1" noEditPoints="1" noAdjustHandles="1" noChangeArrowheads="1" noChangeShapeType="1" noTextEdit="1"/>
               </p:cNvSpPr>
-              <p:nvPr/>
+              <p:nvPr>
+                <p:ph idx="1"/>
+              </p:nvPr>
             </p:nvSpPr>
             <p:spPr>
-              <a:xfrm>
-                <a:off x="315286" y="4161012"/>
-                <a:ext cx="4304339" cy="2123658"/>
-              </a:xfrm>
-              <a:prstGeom prst="rect">
-                <a:avLst/>
-              </a:prstGeom>
               <a:blipFill>
-                <a:blip r:embed="rId4"/>
+                <a:blip r:embed="rId2"/>
                 <a:stretch>
-                  <a:fillRect l="-2266" t="-2299" r="-1133" b="-3736"/>
+                  <a:fillRect l="-1043" t="-2241"/>
                 </a:stretch>
               </a:blipFill>
             </p:spPr>
@@ -6141,7 +6790,7 @@
     </p:spTree>
     <p:extLst>
       <p:ext uri="{BB962C8B-B14F-4D97-AF65-F5344CB8AC3E}">
-        <p14:creationId xmlns:p14="http://schemas.microsoft.com/office/powerpoint/2010/main" val="3779462781"/>
+        <p14:creationId xmlns:p14="http://schemas.microsoft.com/office/powerpoint/2010/main" val="946737534"/>
       </p:ext>
     </p:extLst>
   </p:cSld>

</xml_diff>